<commit_message>
add study overview diagram and audio assets
</commit_message>
<xml_diff>
--- a/design/Marvel Icon.pptx
+++ b/design/Marvel Icon.pptx
@@ -5,14 +5,15 @@
     <p:sldMasterId id="2147483648" r:id="rId1"/>
   </p:sldMasterIdLst>
   <p:notesMasterIdLst>
-    <p:notesMasterId r:id="rId5"/>
+    <p:notesMasterId r:id="rId6"/>
   </p:notesMasterIdLst>
   <p:sldIdLst>
     <p:sldId id="262" r:id="rId2"/>
     <p:sldId id="268" r:id="rId3"/>
     <p:sldId id="269" r:id="rId4"/>
+    <p:sldId id="259" r:id="rId5"/>
   </p:sldIdLst>
-  <p:sldSz cx="9144000" cy="6858000" type="screen4x3"/>
+  <p:sldSz cx="12192000" cy="6858000"/>
   <p:notesSz cx="6858000" cy="9144000"/>
   <p:defaultTextStyle>
     <a:defPPr>
@@ -112,12 +113,12 @@
   <p:extLst>
     <p:ext uri="{EFAFB233-063F-42B5-8137-9DF3F51BA10A}">
       <p15:sldGuideLst xmlns:p15="http://schemas.microsoft.com/office/powerpoint/2012/main">
-        <p15:guide id="1" orient="horz" pos="2160">
+        <p15:guide id="1" orient="horz" pos="2160" userDrawn="1">
           <p15:clr>
             <a:srgbClr val="A4A3A4"/>
           </p15:clr>
         </p15:guide>
-        <p15:guide id="2" pos="2880">
+        <p15:guide id="2" pos="3840" userDrawn="1">
           <p15:clr>
             <a:srgbClr val="A4A3A4"/>
           </p15:clr>
@@ -228,8 +229,8 @@
         </p:nvSpPr>
         <p:spPr>
           <a:xfrm>
-            <a:off x="1143000" y="685800"/>
-            <a:ext cx="4572000" cy="3429000"/>
+            <a:off x="381000" y="685800"/>
+            <a:ext cx="6096000" cy="3429000"/>
           </a:xfrm>
           <a:prstGeom prst="rect">
             <a:avLst/>
@@ -507,8 +508,8 @@
         </p:nvSpPr>
         <p:spPr>
           <a:xfrm>
-            <a:off x="685800" y="2130425"/>
-            <a:ext cx="7772400" cy="1470025"/>
+            <a:off x="914400" y="2130426"/>
+            <a:ext cx="10363200" cy="1470025"/>
           </a:xfrm>
         </p:spPr>
         <p:txBody>
@@ -535,8 +536,8 @@
         </p:nvSpPr>
         <p:spPr>
           <a:xfrm>
-            <a:off x="1371600" y="3886200"/>
-            <a:ext cx="6400800" cy="1752600"/>
+            <a:off x="1828800" y="3886200"/>
+            <a:ext cx="8534400" cy="1752600"/>
           </a:xfrm>
         </p:spPr>
         <p:txBody>
@@ -919,8 +920,8 @@
         </p:nvSpPr>
         <p:spPr>
           <a:xfrm>
-            <a:off x="6629400" y="274638"/>
-            <a:ext cx="2057400" cy="5851525"/>
+            <a:off x="8839200" y="274639"/>
+            <a:ext cx="2743200" cy="5851525"/>
           </a:xfrm>
         </p:spPr>
         <p:txBody>
@@ -947,8 +948,8 @@
         </p:nvSpPr>
         <p:spPr>
           <a:xfrm>
-            <a:off x="457200" y="274638"/>
-            <a:ext cx="6019800" cy="5851525"/>
+            <a:off x="609600" y="274639"/>
+            <a:ext cx="8026400" cy="5851525"/>
           </a:xfrm>
         </p:spPr>
         <p:txBody>
@@ -1269,8 +1270,8 @@
         </p:nvSpPr>
         <p:spPr>
           <a:xfrm>
-            <a:off x="722313" y="4406900"/>
-            <a:ext cx="7772400" cy="1362075"/>
+            <a:off x="963084" y="4406901"/>
+            <a:ext cx="10363200" cy="1362075"/>
           </a:xfrm>
         </p:spPr>
         <p:txBody>
@@ -1301,8 +1302,8 @@
         </p:nvSpPr>
         <p:spPr>
           <a:xfrm>
-            <a:off x="722313" y="2906713"/>
-            <a:ext cx="7772400" cy="1500187"/>
+            <a:off x="963084" y="2906713"/>
+            <a:ext cx="10363200" cy="1500187"/>
           </a:xfrm>
         </p:spPr>
         <p:txBody>
@@ -1538,8 +1539,8 @@
         </p:nvSpPr>
         <p:spPr>
           <a:xfrm>
-            <a:off x="457200" y="1600200"/>
-            <a:ext cx="4038600" cy="4525963"/>
+            <a:off x="609600" y="1600201"/>
+            <a:ext cx="5384800" cy="4525963"/>
           </a:xfrm>
         </p:spPr>
         <p:txBody>
@@ -1623,8 +1624,8 @@
         </p:nvSpPr>
         <p:spPr>
           <a:xfrm>
-            <a:off x="4648200" y="1600200"/>
-            <a:ext cx="4038600" cy="4525963"/>
+            <a:off x="6197600" y="1600201"/>
+            <a:ext cx="5384800" cy="4525963"/>
           </a:xfrm>
         </p:spPr>
         <p:txBody>
@@ -1830,8 +1831,8 @@
         </p:nvSpPr>
         <p:spPr>
           <a:xfrm>
-            <a:off x="457200" y="1535113"/>
-            <a:ext cx="4040188" cy="639762"/>
+            <a:off x="609600" y="1535113"/>
+            <a:ext cx="5386917" cy="639762"/>
           </a:xfrm>
         </p:spPr>
         <p:txBody>
@@ -1895,8 +1896,8 @@
         </p:nvSpPr>
         <p:spPr>
           <a:xfrm>
-            <a:off x="457200" y="2174875"/>
-            <a:ext cx="4040188" cy="3951288"/>
+            <a:off x="609600" y="2174875"/>
+            <a:ext cx="5386917" cy="3951288"/>
           </a:xfrm>
         </p:spPr>
         <p:txBody>
@@ -1980,8 +1981,8 @@
         </p:nvSpPr>
         <p:spPr>
           <a:xfrm>
-            <a:off x="4645025" y="1535113"/>
-            <a:ext cx="4041775" cy="639762"/>
+            <a:off x="6193368" y="1535113"/>
+            <a:ext cx="5389033" cy="639762"/>
           </a:xfrm>
         </p:spPr>
         <p:txBody>
@@ -2045,8 +2046,8 @@
         </p:nvSpPr>
         <p:spPr>
           <a:xfrm>
-            <a:off x="4645025" y="2174875"/>
-            <a:ext cx="4041775" cy="3951288"/>
+            <a:off x="6193368" y="2174875"/>
+            <a:ext cx="5389033" cy="3951288"/>
           </a:xfrm>
         </p:spPr>
         <p:txBody>
@@ -2438,8 +2439,8 @@
         </p:nvSpPr>
         <p:spPr>
           <a:xfrm>
-            <a:off x="457200" y="273050"/>
-            <a:ext cx="3008313" cy="1162050"/>
+            <a:off x="609601" y="273050"/>
+            <a:ext cx="4011084" cy="1162050"/>
           </a:xfrm>
         </p:spPr>
         <p:txBody>
@@ -2470,8 +2471,8 @@
         </p:nvSpPr>
         <p:spPr>
           <a:xfrm>
-            <a:off x="3575050" y="273050"/>
-            <a:ext cx="5111750" cy="5853113"/>
+            <a:off x="4766733" y="273051"/>
+            <a:ext cx="6815667" cy="5853113"/>
           </a:xfrm>
         </p:spPr>
         <p:txBody>
@@ -2555,8 +2556,8 @@
         </p:nvSpPr>
         <p:spPr>
           <a:xfrm>
-            <a:off x="457200" y="1435100"/>
-            <a:ext cx="3008313" cy="4691063"/>
+            <a:off x="609601" y="1435101"/>
+            <a:ext cx="4011084" cy="4691063"/>
           </a:xfrm>
         </p:spPr>
         <p:txBody>
@@ -2715,8 +2716,8 @@
         </p:nvSpPr>
         <p:spPr>
           <a:xfrm>
-            <a:off x="1792288" y="4800600"/>
-            <a:ext cx="5486400" cy="566738"/>
+            <a:off x="2389717" y="4800600"/>
+            <a:ext cx="7315200" cy="566738"/>
           </a:xfrm>
         </p:spPr>
         <p:txBody>
@@ -2747,8 +2748,8 @@
         </p:nvSpPr>
         <p:spPr>
           <a:xfrm>
-            <a:off x="1792288" y="612775"/>
-            <a:ext cx="5486400" cy="4114800"/>
+            <a:off x="2389717" y="612775"/>
+            <a:ext cx="7315200" cy="4114800"/>
           </a:xfrm>
         </p:spPr>
         <p:txBody>
@@ -2808,8 +2809,8 @@
         </p:nvSpPr>
         <p:spPr>
           <a:xfrm>
-            <a:off x="1792288" y="5367338"/>
-            <a:ext cx="5486400" cy="804862"/>
+            <a:off x="2389717" y="5367338"/>
+            <a:ext cx="7315200" cy="804862"/>
           </a:xfrm>
         </p:spPr>
         <p:txBody>
@@ -2973,8 +2974,8 @@
         </p:nvSpPr>
         <p:spPr>
           <a:xfrm>
-            <a:off x="457200" y="274638"/>
-            <a:ext cx="8229600" cy="1143000"/>
+            <a:off x="609600" y="274638"/>
+            <a:ext cx="10972800" cy="1143000"/>
           </a:xfrm>
           <a:prstGeom prst="rect">
             <a:avLst/>
@@ -3006,8 +3007,8 @@
         </p:nvSpPr>
         <p:spPr>
           <a:xfrm>
-            <a:off x="457200" y="1600200"/>
-            <a:ext cx="8229600" cy="4525963"/>
+            <a:off x="609600" y="1600201"/>
+            <a:ext cx="10972800" cy="4525963"/>
           </a:xfrm>
           <a:prstGeom prst="rect">
             <a:avLst/>
@@ -3068,8 +3069,8 @@
         </p:nvSpPr>
         <p:spPr>
           <a:xfrm>
-            <a:off x="457200" y="6356350"/>
-            <a:ext cx="2133600" cy="365125"/>
+            <a:off x="609600" y="6356351"/>
+            <a:ext cx="2844800" cy="365125"/>
           </a:xfrm>
           <a:prstGeom prst="rect">
             <a:avLst/>
@@ -3109,8 +3110,8 @@
         </p:nvSpPr>
         <p:spPr>
           <a:xfrm>
-            <a:off x="3124200" y="6356350"/>
-            <a:ext cx="2895600" cy="365125"/>
+            <a:off x="4165600" y="6356351"/>
+            <a:ext cx="3860800" cy="365125"/>
           </a:xfrm>
           <a:prstGeom prst="rect">
             <a:avLst/>
@@ -3146,8 +3147,8 @@
         </p:nvSpPr>
         <p:spPr>
           <a:xfrm>
-            <a:off x="6553200" y="6356350"/>
-            <a:ext cx="2133600" cy="365125"/>
+            <a:off x="8737600" y="6356351"/>
+            <a:ext cx="2844800" cy="365125"/>
           </a:xfrm>
           <a:prstGeom prst="rect">
             <a:avLst/>
@@ -3474,7 +3475,7 @@
         </p:nvSpPr>
         <p:spPr>
           <a:xfrm>
-            <a:off x="2045269" y="1896945"/>
+            <a:off x="3569269" y="1896946"/>
             <a:ext cx="2193734" cy="1913477"/>
           </a:xfrm>
           <a:prstGeom prst="rect">
@@ -3521,7 +3522,7 @@
         </p:nvSpPr>
         <p:spPr>
           <a:xfrm>
-            <a:off x="4271997" y="2085349"/>
+            <a:off x="5795998" y="2085349"/>
             <a:ext cx="2541553" cy="1569660"/>
           </a:xfrm>
           <a:prstGeom prst="rect">
@@ -3581,7 +3582,7 @@
         </p:nvSpPr>
         <p:spPr>
           <a:xfrm>
-            <a:off x="1961460" y="4031172"/>
+            <a:off x="3485460" y="4031173"/>
             <a:ext cx="5625896" cy="748923"/>
           </a:xfrm>
           <a:prstGeom prst="rect">
@@ -3723,7 +3724,7 @@
         </p:nvSpPr>
         <p:spPr>
           <a:xfrm>
-            <a:off x="2045269" y="1896945"/>
+            <a:off x="3569269" y="1896946"/>
             <a:ext cx="2193734" cy="1913477"/>
           </a:xfrm>
           <a:prstGeom prst="rect">
@@ -3770,7 +3771,7 @@
         </p:nvSpPr>
         <p:spPr>
           <a:xfrm>
-            <a:off x="4271997" y="2085349"/>
+            <a:off x="5795998" y="2085349"/>
             <a:ext cx="2541553" cy="1569660"/>
           </a:xfrm>
           <a:prstGeom prst="rect">
@@ -3860,7 +3861,7 @@
         </p:nvSpPr>
         <p:spPr>
           <a:xfrm>
-            <a:off x="2045269" y="1896945"/>
+            <a:off x="3569269" y="1896946"/>
             <a:ext cx="2193734" cy="1913477"/>
           </a:xfrm>
           <a:prstGeom prst="rect">
@@ -3903,6 +3904,765 @@
     <p:extLst>
       <p:ext uri="{BB962C8B-B14F-4D97-AF65-F5344CB8AC3E}">
         <p14:creationId xmlns:p14="http://schemas.microsoft.com/office/powerpoint/2010/main" val="400622258"/>
+      </p:ext>
+    </p:extLst>
+  </p:cSld>
+  <p:clrMapOvr>
+    <a:masterClrMapping/>
+  </p:clrMapOvr>
+</p:sld>
+</file>
+
+<file path=ppt/slides/slide4.xml><?xml version="1.0" encoding="utf-8"?>
+<p:sld xmlns:a="http://schemas.openxmlformats.org/drawingml/2006/main" xmlns:r="http://schemas.openxmlformats.org/officeDocument/2006/relationships" xmlns:p="http://schemas.openxmlformats.org/presentationml/2006/main">
+  <p:cSld>
+    <p:spTree>
+      <p:nvGrpSpPr>
+        <p:cNvPr id="1" name=""/>
+        <p:cNvGrpSpPr/>
+        <p:nvPr/>
+      </p:nvGrpSpPr>
+      <p:grpSpPr>
+        <a:xfrm>
+          <a:off x="0" y="0"/>
+          <a:ext cx="0" cy="0"/>
+          <a:chOff x="0" y="0"/>
+          <a:chExt cx="0" cy="0"/>
+        </a:xfrm>
+      </p:grpSpPr>
+      <p:cxnSp>
+        <p:nvCxnSpPr>
+          <p:cNvPr id="2" name="Straight Arrow Connector 1"/>
+          <p:cNvCxnSpPr/>
+          <p:nvPr/>
+        </p:nvCxnSpPr>
+        <p:spPr>
+          <a:xfrm flipV="1">
+            <a:off x="3067051" y="3476626"/>
+            <a:ext cx="6886575" cy="2055"/>
+          </a:xfrm>
+          <a:prstGeom prst="straightConnector1">
+            <a:avLst/>
+          </a:prstGeom>
+          <a:ln w="76200">
+            <a:solidFill>
+              <a:schemeClr val="tx1">
+                <a:lumMod val="75000"/>
+                <a:lumOff val="25000"/>
+              </a:schemeClr>
+            </a:solidFill>
+            <a:tailEnd type="triangle"/>
+          </a:ln>
+        </p:spPr>
+        <p:style>
+          <a:lnRef idx="1">
+            <a:schemeClr val="accent1"/>
+          </a:lnRef>
+          <a:fillRef idx="0">
+            <a:schemeClr val="accent1"/>
+          </a:fillRef>
+          <a:effectRef idx="0">
+            <a:schemeClr val="accent1"/>
+          </a:effectRef>
+          <a:fontRef idx="minor">
+            <a:schemeClr val="tx1"/>
+          </a:fontRef>
+        </p:style>
+      </p:cxnSp>
+      <p:sp>
+        <p:nvSpPr>
+          <p:cNvPr id="4" name="TextBox 3"/>
+          <p:cNvSpPr txBox="1"/>
+          <p:nvPr/>
+        </p:nvSpPr>
+        <p:spPr>
+          <a:xfrm>
+            <a:off x="6042319" y="4033462"/>
+            <a:ext cx="1627369" cy="715581"/>
+          </a:xfrm>
+          <a:prstGeom prst="rect">
+            <a:avLst/>
+          </a:prstGeom>
+          <a:noFill/>
+        </p:spPr>
+        <p:txBody>
+          <a:bodyPr wrap="none" rtlCol="0">
+            <a:spAutoFit/>
+          </a:bodyPr>
+          <a:lstStyle/>
+          <a:p>
+            <a:r>
+              <a:rPr lang="en-GB" sz="1350" b="1" dirty="0">
+                <a:latin typeface="Helvetica Neue"/>
+                <a:sym typeface="Symbol" panose="05050102010706020507" pitchFamily="18" charset="2"/>
+              </a:rPr>
+              <a:t>Primary Endpoint</a:t>
+            </a:r>
+          </a:p>
+          <a:p>
+            <a:r>
+              <a:rPr lang="en-GB" sz="1350" dirty="0">
+                <a:latin typeface="Helvetica Neue"/>
+              </a:rPr>
+              <a:t>Clinical response</a:t>
+            </a:r>
+          </a:p>
+          <a:p>
+            <a:r>
+              <a:rPr lang="en-GB" sz="1350" dirty="0">
+                <a:latin typeface="Helvetica Neue"/>
+              </a:rPr>
+              <a:t>Full Mayo Score</a:t>
+            </a:r>
+          </a:p>
+        </p:txBody>
+      </p:sp>
+      <p:sp>
+        <p:nvSpPr>
+          <p:cNvPr id="7" name="TextBox 6"/>
+          <p:cNvSpPr txBox="1"/>
+          <p:nvPr/>
+        </p:nvSpPr>
+        <p:spPr>
+          <a:xfrm>
+            <a:off x="8545376" y="4027937"/>
+            <a:ext cx="1867819" cy="715581"/>
+          </a:xfrm>
+          <a:prstGeom prst="rect">
+            <a:avLst/>
+          </a:prstGeom>
+          <a:noFill/>
+        </p:spPr>
+        <p:txBody>
+          <a:bodyPr wrap="none" rtlCol="0">
+            <a:spAutoFit/>
+          </a:bodyPr>
+          <a:lstStyle/>
+          <a:p>
+            <a:r>
+              <a:rPr lang="en-GB" sz="1350" b="1" dirty="0">
+                <a:latin typeface="Helvetica Neue"/>
+              </a:rPr>
+              <a:t>Secondary </a:t>
+            </a:r>
+            <a:r>
+              <a:rPr lang="en-GB" sz="1350" b="1" dirty="0">
+                <a:latin typeface="Helvetica Neue"/>
+                <a:sym typeface="Symbol" panose="05050102010706020507" pitchFamily="18" charset="2"/>
+              </a:rPr>
+              <a:t>Endpoint</a:t>
+            </a:r>
+          </a:p>
+          <a:p>
+            <a:r>
+              <a:rPr lang="en-GB" sz="1350" dirty="0">
+                <a:latin typeface="Helvetica Neue"/>
+              </a:rPr>
+              <a:t>Clinical remission</a:t>
+            </a:r>
+          </a:p>
+          <a:p>
+            <a:r>
+              <a:rPr lang="en-GB" sz="1350" dirty="0">
+                <a:latin typeface="Helvetica Neue"/>
+              </a:rPr>
+              <a:t>Treatment escalation</a:t>
+            </a:r>
+          </a:p>
+        </p:txBody>
+      </p:sp>
+      <p:sp>
+        <p:nvSpPr>
+          <p:cNvPr id="9" name="TextBox 8"/>
+          <p:cNvSpPr txBox="1"/>
+          <p:nvPr/>
+        </p:nvSpPr>
+        <p:spPr>
+          <a:xfrm>
+            <a:off x="3033973" y="2496530"/>
+            <a:ext cx="5511403" cy="738664"/>
+          </a:xfrm>
+          <a:prstGeom prst="rect">
+            <a:avLst/>
+          </a:prstGeom>
+          <a:noFill/>
+        </p:spPr>
+        <p:txBody>
+          <a:bodyPr wrap="square" rtlCol="0">
+            <a:spAutoFit/>
+          </a:bodyPr>
+          <a:lstStyle/>
+          <a:p>
+            <a:r>
+              <a:rPr lang="en-GB" sz="1400" b="1" dirty="0">
+                <a:solidFill>
+                  <a:srgbClr val="008000"/>
+                </a:solidFill>
+                <a:latin typeface="Helvetica Neue"/>
+              </a:rPr>
+              <a:t>Mitochondrial antioxidant vs placebo (24 weeks duration)</a:t>
+            </a:r>
+          </a:p>
+          <a:p>
+            <a:r>
+              <a:rPr lang="en-GB" sz="1400" b="1" dirty="0">
+                <a:latin typeface="Helvetica Neue"/>
+                <a:sym typeface="Symbol" panose="05050102010706020507" pitchFamily="18" charset="2"/>
+              </a:rPr>
+              <a:t>+</a:t>
+            </a:r>
+          </a:p>
+          <a:p>
+            <a:r>
+              <a:rPr lang="en-GB" sz="1400" b="1" dirty="0">
+                <a:latin typeface="Helvetica Neue"/>
+              </a:rPr>
+              <a:t>Oral Prednisolone 40mg </a:t>
+            </a:r>
+            <a:r>
+              <a:rPr lang="en-GB" sz="1400" b="1" dirty="0">
+                <a:latin typeface="Helvetica Neue"/>
+                <a:sym typeface="Symbol" panose="05050102010706020507" pitchFamily="18" charset="2"/>
+              </a:rPr>
+              <a:t>(tapering by 5mg/week)</a:t>
+            </a:r>
+            <a:endParaRPr lang="en-GB" sz="1350" b="1" dirty="0">
+              <a:solidFill>
+                <a:srgbClr val="00B050"/>
+              </a:solidFill>
+              <a:latin typeface="Helvetica Neue"/>
+              <a:sym typeface="Symbol" panose="05050102010706020507" pitchFamily="18" charset="2"/>
+            </a:endParaRPr>
+          </a:p>
+        </p:txBody>
+      </p:sp>
+      <p:sp>
+        <p:nvSpPr>
+          <p:cNvPr id="10" name="TextBox 9"/>
+          <p:cNvSpPr txBox="1"/>
+          <p:nvPr/>
+        </p:nvSpPr>
+        <p:spPr>
+          <a:xfrm>
+            <a:off x="1482100" y="1911363"/>
+            <a:ext cx="1451038" cy="461665"/>
+          </a:xfrm>
+          <a:prstGeom prst="rect">
+            <a:avLst/>
+          </a:prstGeom>
+          <a:noFill/>
+          <a:ln w="38100">
+            <a:solidFill>
+              <a:schemeClr val="tx1">
+                <a:lumMod val="75000"/>
+                <a:lumOff val="25000"/>
+              </a:schemeClr>
+            </a:solidFill>
+          </a:ln>
+        </p:spPr>
+        <p:txBody>
+          <a:bodyPr wrap="none" rtlCol="0">
+            <a:spAutoFit/>
+          </a:bodyPr>
+          <a:lstStyle/>
+          <a:p>
+            <a:r>
+              <a:rPr lang="en-GB" sz="2400" b="1" dirty="0">
+                <a:latin typeface="Helvetica Neue"/>
+                <a:sym typeface="Symbol" panose="05050102010706020507" pitchFamily="18" charset="2"/>
+              </a:rPr>
+              <a:t>UC Flare</a:t>
+            </a:r>
+          </a:p>
+        </p:txBody>
+      </p:sp>
+      <p:cxnSp>
+        <p:nvCxnSpPr>
+          <p:cNvPr id="13" name="Straight Connector 12"/>
+          <p:cNvCxnSpPr>
+            <a:cxnSpLocks/>
+          </p:cNvCxnSpPr>
+          <p:nvPr/>
+        </p:nvCxnSpPr>
+        <p:spPr>
+          <a:xfrm>
+            <a:off x="3067051" y="3371939"/>
+            <a:ext cx="1422399" cy="0"/>
+          </a:xfrm>
+          <a:prstGeom prst="line">
+            <a:avLst/>
+          </a:prstGeom>
+          <a:ln w="76200">
+            <a:solidFill>
+              <a:srgbClr val="008000"/>
+            </a:solidFill>
+          </a:ln>
+        </p:spPr>
+        <p:style>
+          <a:lnRef idx="1">
+            <a:schemeClr val="accent1"/>
+          </a:lnRef>
+          <a:fillRef idx="0">
+            <a:schemeClr val="accent1"/>
+          </a:fillRef>
+          <a:effectRef idx="0">
+            <a:schemeClr val="accent1"/>
+          </a:effectRef>
+          <a:fontRef idx="minor">
+            <a:schemeClr val="tx1"/>
+          </a:fontRef>
+        </p:style>
+      </p:cxnSp>
+      <p:sp>
+        <p:nvSpPr>
+          <p:cNvPr id="14" name="TextBox 13"/>
+          <p:cNvSpPr txBox="1"/>
+          <p:nvPr/>
+        </p:nvSpPr>
+        <p:spPr>
+          <a:xfrm>
+            <a:off x="4913427" y="3735209"/>
+            <a:ext cx="798552" cy="307777"/>
+          </a:xfrm>
+          <a:prstGeom prst="rect">
+            <a:avLst/>
+          </a:prstGeom>
+          <a:noFill/>
+        </p:spPr>
+        <p:txBody>
+          <a:bodyPr wrap="none" rtlCol="0">
+            <a:spAutoFit/>
+          </a:bodyPr>
+          <a:lstStyle/>
+          <a:p>
+            <a:r>
+              <a:rPr lang="en-GB" sz="1400" b="1" dirty="0">
+                <a:latin typeface="Helvetica Neue"/>
+              </a:rPr>
+              <a:t>Week 8</a:t>
+            </a:r>
+          </a:p>
+        </p:txBody>
+      </p:sp>
+      <p:cxnSp>
+        <p:nvCxnSpPr>
+          <p:cNvPr id="17" name="Straight Connector 16"/>
+          <p:cNvCxnSpPr/>
+          <p:nvPr/>
+        </p:nvCxnSpPr>
+        <p:spPr>
+          <a:xfrm flipV="1">
+            <a:off x="1564650" y="3478681"/>
+            <a:ext cx="1443037" cy="2918"/>
+          </a:xfrm>
+          <a:prstGeom prst="line">
+            <a:avLst/>
+          </a:prstGeom>
+          <a:ln w="76200">
+            <a:solidFill>
+              <a:schemeClr val="tx1">
+                <a:lumMod val="75000"/>
+                <a:lumOff val="25000"/>
+              </a:schemeClr>
+            </a:solidFill>
+            <a:prstDash val="sysDot"/>
+          </a:ln>
+        </p:spPr>
+        <p:style>
+          <a:lnRef idx="1">
+            <a:schemeClr val="accent1"/>
+          </a:lnRef>
+          <a:fillRef idx="0">
+            <a:schemeClr val="accent1"/>
+          </a:fillRef>
+          <a:effectRef idx="0">
+            <a:schemeClr val="accent1"/>
+          </a:effectRef>
+          <a:fontRef idx="minor">
+            <a:schemeClr val="tx1"/>
+          </a:fontRef>
+        </p:style>
+      </p:cxnSp>
+      <p:cxnSp>
+        <p:nvCxnSpPr>
+          <p:cNvPr id="20" name="Straight Connector 19"/>
+          <p:cNvCxnSpPr/>
+          <p:nvPr/>
+        </p:nvCxnSpPr>
+        <p:spPr>
+          <a:xfrm>
+            <a:off x="3104014" y="3441358"/>
+            <a:ext cx="0" cy="266700"/>
+          </a:xfrm>
+          <a:prstGeom prst="line">
+            <a:avLst/>
+          </a:prstGeom>
+          <a:ln w="76200">
+            <a:solidFill>
+              <a:schemeClr val="tx1">
+                <a:lumMod val="75000"/>
+                <a:lumOff val="25000"/>
+              </a:schemeClr>
+            </a:solidFill>
+          </a:ln>
+        </p:spPr>
+        <p:style>
+          <a:lnRef idx="1">
+            <a:schemeClr val="accent1"/>
+          </a:lnRef>
+          <a:fillRef idx="0">
+            <a:schemeClr val="accent1"/>
+          </a:fillRef>
+          <a:effectRef idx="0">
+            <a:schemeClr val="accent1"/>
+          </a:effectRef>
+          <a:fontRef idx="minor">
+            <a:schemeClr val="tx1"/>
+          </a:fontRef>
+        </p:style>
+      </p:cxnSp>
+      <p:cxnSp>
+        <p:nvCxnSpPr>
+          <p:cNvPr id="21" name="Straight Connector 20"/>
+          <p:cNvCxnSpPr/>
+          <p:nvPr/>
+        </p:nvCxnSpPr>
+        <p:spPr>
+          <a:xfrm>
+            <a:off x="5302348" y="3457575"/>
+            <a:ext cx="0" cy="266700"/>
+          </a:xfrm>
+          <a:prstGeom prst="line">
+            <a:avLst/>
+          </a:prstGeom>
+          <a:ln w="76200">
+            <a:solidFill>
+              <a:schemeClr val="tx1">
+                <a:lumMod val="75000"/>
+                <a:lumOff val="25000"/>
+              </a:schemeClr>
+            </a:solidFill>
+          </a:ln>
+        </p:spPr>
+        <p:style>
+          <a:lnRef idx="1">
+            <a:schemeClr val="accent1"/>
+          </a:lnRef>
+          <a:fillRef idx="0">
+            <a:schemeClr val="accent1"/>
+          </a:fillRef>
+          <a:effectRef idx="0">
+            <a:schemeClr val="accent1"/>
+          </a:effectRef>
+          <a:fontRef idx="minor">
+            <a:schemeClr val="tx1"/>
+          </a:fontRef>
+        </p:style>
+      </p:cxnSp>
+      <p:cxnSp>
+        <p:nvCxnSpPr>
+          <p:cNvPr id="22" name="Straight Connector 21"/>
+          <p:cNvCxnSpPr/>
+          <p:nvPr/>
+        </p:nvCxnSpPr>
+        <p:spPr>
+          <a:xfrm>
+            <a:off x="6491288" y="3457575"/>
+            <a:ext cx="0" cy="266700"/>
+          </a:xfrm>
+          <a:prstGeom prst="line">
+            <a:avLst/>
+          </a:prstGeom>
+          <a:ln w="76200">
+            <a:solidFill>
+              <a:schemeClr val="tx1">
+                <a:lumMod val="75000"/>
+                <a:lumOff val="25000"/>
+              </a:schemeClr>
+            </a:solidFill>
+          </a:ln>
+        </p:spPr>
+        <p:style>
+          <a:lnRef idx="1">
+            <a:schemeClr val="accent1"/>
+          </a:lnRef>
+          <a:fillRef idx="0">
+            <a:schemeClr val="accent1"/>
+          </a:fillRef>
+          <a:effectRef idx="0">
+            <a:schemeClr val="accent1"/>
+          </a:effectRef>
+          <a:fontRef idx="minor">
+            <a:schemeClr val="tx1"/>
+          </a:fontRef>
+        </p:style>
+      </p:cxnSp>
+      <p:cxnSp>
+        <p:nvCxnSpPr>
+          <p:cNvPr id="24" name="Straight Connector 23"/>
+          <p:cNvCxnSpPr/>
+          <p:nvPr/>
+        </p:nvCxnSpPr>
+        <p:spPr>
+          <a:xfrm>
+            <a:off x="8991600" y="3448050"/>
+            <a:ext cx="0" cy="266700"/>
+          </a:xfrm>
+          <a:prstGeom prst="line">
+            <a:avLst/>
+          </a:prstGeom>
+          <a:ln w="76200">
+            <a:solidFill>
+              <a:schemeClr val="tx1">
+                <a:lumMod val="75000"/>
+                <a:lumOff val="25000"/>
+              </a:schemeClr>
+            </a:solidFill>
+          </a:ln>
+        </p:spPr>
+        <p:style>
+          <a:lnRef idx="1">
+            <a:schemeClr val="accent1"/>
+          </a:lnRef>
+          <a:fillRef idx="0">
+            <a:schemeClr val="accent1"/>
+          </a:fillRef>
+          <a:effectRef idx="0">
+            <a:schemeClr val="accent1"/>
+          </a:effectRef>
+          <a:fontRef idx="minor">
+            <a:schemeClr val="tx1"/>
+          </a:fontRef>
+        </p:style>
+      </p:cxnSp>
+      <p:sp>
+        <p:nvSpPr>
+          <p:cNvPr id="26" name="TextBox 25"/>
+          <p:cNvSpPr txBox="1"/>
+          <p:nvPr/>
+        </p:nvSpPr>
+        <p:spPr>
+          <a:xfrm>
+            <a:off x="1482100" y="2496530"/>
+            <a:ext cx="1386918" cy="523220"/>
+          </a:xfrm>
+          <a:prstGeom prst="rect">
+            <a:avLst/>
+          </a:prstGeom>
+          <a:noFill/>
+        </p:spPr>
+        <p:txBody>
+          <a:bodyPr wrap="none" rtlCol="0">
+            <a:spAutoFit/>
+          </a:bodyPr>
+          <a:lstStyle/>
+          <a:p>
+            <a:r>
+              <a:rPr lang="en-GB" sz="1400" b="1" dirty="0">
+                <a:solidFill>
+                  <a:srgbClr val="008000"/>
+                </a:solidFill>
+                <a:latin typeface="Helvetica Neue"/>
+              </a:rPr>
+              <a:t>Screening</a:t>
+            </a:r>
+          </a:p>
+          <a:p>
+            <a:r>
+              <a:rPr lang="en-GB" sz="1400" b="1" dirty="0">
+                <a:solidFill>
+                  <a:srgbClr val="008000"/>
+                </a:solidFill>
+                <a:latin typeface="Helvetica Neue"/>
+              </a:rPr>
+              <a:t>(Max 2 weeks)</a:t>
+            </a:r>
+          </a:p>
+        </p:txBody>
+      </p:sp>
+      <p:cxnSp>
+        <p:nvCxnSpPr>
+          <p:cNvPr id="28" name="Straight Connector 27"/>
+          <p:cNvCxnSpPr>
+            <a:cxnSpLocks/>
+          </p:cNvCxnSpPr>
+          <p:nvPr/>
+        </p:nvCxnSpPr>
+        <p:spPr>
+          <a:xfrm>
+            <a:off x="4489450" y="3371939"/>
+            <a:ext cx="1055726" cy="0"/>
+          </a:xfrm>
+          <a:prstGeom prst="line">
+            <a:avLst/>
+          </a:prstGeom>
+          <a:ln w="76200">
+            <a:solidFill>
+              <a:srgbClr val="008000"/>
+            </a:solidFill>
+            <a:prstDash val="sysDot"/>
+          </a:ln>
+        </p:spPr>
+        <p:style>
+          <a:lnRef idx="1">
+            <a:schemeClr val="accent1"/>
+          </a:lnRef>
+          <a:fillRef idx="0">
+            <a:schemeClr val="accent1"/>
+          </a:fillRef>
+          <a:effectRef idx="0">
+            <a:schemeClr val="accent1"/>
+          </a:effectRef>
+          <a:fontRef idx="minor">
+            <a:schemeClr val="tx1"/>
+          </a:fontRef>
+        </p:style>
+      </p:cxnSp>
+      <p:sp>
+        <p:nvSpPr>
+          <p:cNvPr id="23" name="TextBox 22">
+            <a:extLst>
+              <a:ext uri="{FF2B5EF4-FFF2-40B4-BE49-F238E27FC236}">
+                <a16:creationId xmlns:a16="http://schemas.microsoft.com/office/drawing/2014/main" id="{29092CA0-D2E9-44A7-B025-6CDDAAA1A48F}"/>
+              </a:ext>
+            </a:extLst>
+          </p:cNvPr>
+          <p:cNvSpPr txBox="1"/>
+          <p:nvPr/>
+        </p:nvSpPr>
+        <p:spPr>
+          <a:xfrm>
+            <a:off x="2704738" y="3725685"/>
+            <a:ext cx="798552" cy="307777"/>
+          </a:xfrm>
+          <a:prstGeom prst="rect">
+            <a:avLst/>
+          </a:prstGeom>
+          <a:noFill/>
+        </p:spPr>
+        <p:txBody>
+          <a:bodyPr wrap="none" rtlCol="0">
+            <a:spAutoFit/>
+          </a:bodyPr>
+          <a:lstStyle/>
+          <a:p>
+            <a:r>
+              <a:rPr lang="en-GB" sz="1400" b="1" dirty="0">
+                <a:latin typeface="Helvetica Neue"/>
+              </a:rPr>
+              <a:t>Week 0</a:t>
+            </a:r>
+          </a:p>
+        </p:txBody>
+      </p:sp>
+      <p:sp>
+        <p:nvSpPr>
+          <p:cNvPr id="25" name="TextBox 24">
+            <a:extLst>
+              <a:ext uri="{FF2B5EF4-FFF2-40B4-BE49-F238E27FC236}">
+                <a16:creationId xmlns:a16="http://schemas.microsoft.com/office/drawing/2014/main" id="{9C6DBEE7-487D-4484-BFBE-A2A0C1026283}"/>
+              </a:ext>
+            </a:extLst>
+          </p:cNvPr>
+          <p:cNvSpPr txBox="1"/>
+          <p:nvPr/>
+        </p:nvSpPr>
+        <p:spPr>
+          <a:xfrm>
+            <a:off x="6042319" y="3732693"/>
+            <a:ext cx="897938" cy="307777"/>
+          </a:xfrm>
+          <a:prstGeom prst="rect">
+            <a:avLst/>
+          </a:prstGeom>
+          <a:noFill/>
+        </p:spPr>
+        <p:txBody>
+          <a:bodyPr wrap="none" rtlCol="0">
+            <a:spAutoFit/>
+          </a:bodyPr>
+          <a:lstStyle/>
+          <a:p>
+            <a:r>
+              <a:rPr lang="en-GB" sz="1400" b="1" dirty="0">
+                <a:latin typeface="Helvetica Neue"/>
+              </a:rPr>
+              <a:t>Week 12</a:t>
+            </a:r>
+          </a:p>
+        </p:txBody>
+      </p:sp>
+      <p:sp>
+        <p:nvSpPr>
+          <p:cNvPr id="27" name="TextBox 26">
+            <a:extLst>
+              <a:ext uri="{FF2B5EF4-FFF2-40B4-BE49-F238E27FC236}">
+                <a16:creationId xmlns:a16="http://schemas.microsoft.com/office/drawing/2014/main" id="{27A88243-9A9C-42AA-BF15-4351968AE3E6}"/>
+              </a:ext>
+            </a:extLst>
+          </p:cNvPr>
+          <p:cNvSpPr txBox="1"/>
+          <p:nvPr/>
+        </p:nvSpPr>
+        <p:spPr>
+          <a:xfrm>
+            <a:off x="8542631" y="3730268"/>
+            <a:ext cx="897938" cy="307777"/>
+          </a:xfrm>
+          <a:prstGeom prst="rect">
+            <a:avLst/>
+          </a:prstGeom>
+          <a:noFill/>
+        </p:spPr>
+        <p:txBody>
+          <a:bodyPr wrap="none" rtlCol="0">
+            <a:spAutoFit/>
+          </a:bodyPr>
+          <a:lstStyle/>
+          <a:p>
+            <a:r>
+              <a:rPr lang="en-GB" sz="1400" b="1" dirty="0">
+                <a:latin typeface="Helvetica Neue"/>
+              </a:rPr>
+              <a:t>Week 24</a:t>
+            </a:r>
+          </a:p>
+        </p:txBody>
+      </p:sp>
+      <p:pic>
+        <p:nvPicPr>
+          <p:cNvPr id="16" name="Picture 15" descr="A green and white sign&#10;&#10;Description automatically generated with medium confidence">
+            <a:extLst>
+              <a:ext uri="{FF2B5EF4-FFF2-40B4-BE49-F238E27FC236}">
+                <a16:creationId xmlns:a16="http://schemas.microsoft.com/office/drawing/2014/main" id="{AE85391A-382E-42A8-BCB5-236FBEE25656}"/>
+              </a:ext>
+            </a:extLst>
+          </p:cNvPr>
+          <p:cNvPicPr>
+            <a:picLocks noChangeAspect="1"/>
+          </p:cNvPicPr>
+          <p:nvPr/>
+        </p:nvPicPr>
+        <p:blipFill>
+          <a:blip r:embed="rId2"/>
+          <a:stretch>
+            <a:fillRect/>
+          </a:stretch>
+        </p:blipFill>
+        <p:spPr>
+          <a:xfrm>
+            <a:off x="8714952" y="1851881"/>
+            <a:ext cx="1238674" cy="580628"/>
+          </a:xfrm>
+          <a:prstGeom prst="rect">
+            <a:avLst/>
+          </a:prstGeom>
+        </p:spPr>
+      </p:pic>
+    </p:spTree>
+    <p:extLst>
+      <p:ext uri="{BB962C8B-B14F-4D97-AF65-F5344CB8AC3E}">
+        <p14:creationId xmlns:p14="http://schemas.microsoft.com/office/powerpoint/2010/main" val="2732009952"/>
       </p:ext>
     </p:extLst>
   </p:cSld>

</xml_diff>

<commit_message>
add analytics and tidy up overview image
</commit_message>
<xml_diff>
--- a/design/Marvel Icon.pptx
+++ b/design/Marvel Icon.pptx
@@ -211,7 +211,7 @@
           <a:p>
             <a:fld id="{53A2C0CD-0C98-644B-B761-F97DDC04F59E}" type="datetimeFigureOut">
               <a:rPr lang="en-US" smtClean="0"/>
-              <a:t>2/14/2022</a:t>
+              <a:t>2/15/2022</a:t>
             </a:fld>
             <a:endParaRPr lang="en-US"/>
           </a:p>
@@ -660,7 +660,7 @@
           <a:p>
             <a:fld id="{B4E1D56B-60CF-8C4B-97C0-D25BCDB18721}" type="datetimeFigureOut">
               <a:rPr lang="en-US" smtClean="0"/>
-              <a:t>2/14/2022</a:t>
+              <a:t>2/15/2022</a:t>
             </a:fld>
             <a:endParaRPr lang="en-US"/>
           </a:p>
@@ -830,7 +830,7 @@
           <a:p>
             <a:fld id="{B4E1D56B-60CF-8C4B-97C0-D25BCDB18721}" type="datetimeFigureOut">
               <a:rPr lang="en-US" smtClean="0"/>
-              <a:t>2/14/2022</a:t>
+              <a:t>2/15/2022</a:t>
             </a:fld>
             <a:endParaRPr lang="en-US"/>
           </a:p>
@@ -1010,7 +1010,7 @@
           <a:p>
             <a:fld id="{B4E1D56B-60CF-8C4B-97C0-D25BCDB18721}" type="datetimeFigureOut">
               <a:rPr lang="en-US" smtClean="0"/>
-              <a:t>2/14/2022</a:t>
+              <a:t>2/15/2022</a:t>
             </a:fld>
             <a:endParaRPr lang="en-US"/>
           </a:p>
@@ -1180,7 +1180,7 @@
           <a:p>
             <a:fld id="{B4E1D56B-60CF-8C4B-97C0-D25BCDB18721}" type="datetimeFigureOut">
               <a:rPr lang="en-US" smtClean="0"/>
-              <a:t>2/14/2022</a:t>
+              <a:t>2/15/2022</a:t>
             </a:fld>
             <a:endParaRPr lang="en-US"/>
           </a:p>
@@ -1426,7 +1426,7 @@
           <a:p>
             <a:fld id="{B4E1D56B-60CF-8C4B-97C0-D25BCDB18721}" type="datetimeFigureOut">
               <a:rPr lang="en-US" smtClean="0"/>
-              <a:t>2/14/2022</a:t>
+              <a:t>2/15/2022</a:t>
             </a:fld>
             <a:endParaRPr lang="en-US"/>
           </a:p>
@@ -1714,7 +1714,7 @@
           <a:p>
             <a:fld id="{B4E1D56B-60CF-8C4B-97C0-D25BCDB18721}" type="datetimeFigureOut">
               <a:rPr lang="en-US" smtClean="0"/>
-              <a:t>2/14/2022</a:t>
+              <a:t>2/15/2022</a:t>
             </a:fld>
             <a:endParaRPr lang="en-US"/>
           </a:p>
@@ -2136,7 +2136,7 @@
           <a:p>
             <a:fld id="{B4E1D56B-60CF-8C4B-97C0-D25BCDB18721}" type="datetimeFigureOut">
               <a:rPr lang="en-US" smtClean="0"/>
-              <a:t>2/14/2022</a:t>
+              <a:t>2/15/2022</a:t>
             </a:fld>
             <a:endParaRPr lang="en-US"/>
           </a:p>
@@ -2254,7 +2254,7 @@
           <a:p>
             <a:fld id="{B4E1D56B-60CF-8C4B-97C0-D25BCDB18721}" type="datetimeFigureOut">
               <a:rPr lang="en-US" smtClean="0"/>
-              <a:t>2/14/2022</a:t>
+              <a:t>2/15/2022</a:t>
             </a:fld>
             <a:endParaRPr lang="en-US"/>
           </a:p>
@@ -2349,7 +2349,7 @@
           <a:p>
             <a:fld id="{B4E1D56B-60CF-8C4B-97C0-D25BCDB18721}" type="datetimeFigureOut">
               <a:rPr lang="en-US" smtClean="0"/>
-              <a:t>2/14/2022</a:t>
+              <a:t>2/15/2022</a:t>
             </a:fld>
             <a:endParaRPr lang="en-US"/>
           </a:p>
@@ -2626,7 +2626,7 @@
           <a:p>
             <a:fld id="{B4E1D56B-60CF-8C4B-97C0-D25BCDB18721}" type="datetimeFigureOut">
               <a:rPr lang="en-US" smtClean="0"/>
-              <a:t>2/14/2022</a:t>
+              <a:t>2/15/2022</a:t>
             </a:fld>
             <a:endParaRPr lang="en-US"/>
           </a:p>
@@ -2879,7 +2879,7 @@
           <a:p>
             <a:fld id="{B4E1D56B-60CF-8C4B-97C0-D25BCDB18721}" type="datetimeFigureOut">
               <a:rPr lang="en-US" smtClean="0"/>
-              <a:t>2/14/2022</a:t>
+              <a:t>2/15/2022</a:t>
             </a:fld>
             <a:endParaRPr lang="en-US"/>
           </a:p>
@@ -3092,7 +3092,7 @@
           <a:p>
             <a:fld id="{B4E1D56B-60CF-8C4B-97C0-D25BCDB18721}" type="datetimeFigureOut">
               <a:rPr lang="en-US" smtClean="0"/>
-              <a:t>2/14/2022</a:t>
+              <a:t>2/15/2022</a:t>
             </a:fld>
             <a:endParaRPr lang="en-US"/>
           </a:p>
@@ -3938,7 +3938,7 @@
         </p:nvCxnSpPr>
         <p:spPr>
           <a:xfrm flipV="1">
-            <a:off x="3067051" y="3476626"/>
+            <a:off x="3067051" y="3078009"/>
             <a:ext cx="6886575" cy="2055"/>
           </a:xfrm>
           <a:prstGeom prst="straightConnector1">
@@ -3946,10 +3946,7 @@
           </a:prstGeom>
           <a:ln w="76200">
             <a:solidFill>
-              <a:schemeClr val="tx1">
-                <a:lumMod val="75000"/>
-                <a:lumOff val="25000"/>
-              </a:schemeClr>
+              <a:srgbClr val="008000"/>
             </a:solidFill>
             <a:tailEnd type="triangle"/>
           </a:ln>
@@ -3977,7 +3974,7 @@
         </p:nvSpPr>
         <p:spPr>
           <a:xfrm>
-            <a:off x="6042319" y="4033462"/>
+            <a:off x="5864519" y="4150595"/>
             <a:ext cx="1627369" cy="715581"/>
           </a:xfrm>
           <a:prstGeom prst="rect">
@@ -4025,7 +4022,7 @@
         </p:nvSpPr>
         <p:spPr>
           <a:xfrm>
-            <a:off x="8545376" y="4027937"/>
+            <a:off x="8545376" y="4145070"/>
             <a:ext cx="1867819" cy="715581"/>
           </a:xfrm>
           <a:prstGeom prst="rect">
@@ -4079,8 +4076,8 @@
         </p:nvSpPr>
         <p:spPr>
           <a:xfrm>
-            <a:off x="3033973" y="2496530"/>
-            <a:ext cx="5511403" cy="738664"/>
+            <a:off x="3033973" y="2726225"/>
+            <a:ext cx="5511403" cy="307777"/>
           </a:xfrm>
           <a:prstGeom prst="rect">
             <a:avLst/>
@@ -4102,34 +4099,7 @@
               </a:rPr>
               <a:t>Mitochondrial antioxidant vs placebo (24 weeks duration)</a:t>
             </a:r>
-          </a:p>
-          <a:p>
-            <a:r>
-              <a:rPr lang="en-GB" sz="1400" b="1" dirty="0">
-                <a:latin typeface="Helvetica Neue"/>
-                <a:sym typeface="Symbol" panose="05050102010706020507" pitchFamily="18" charset="2"/>
-              </a:rPr>
-              <a:t>+</a:t>
-            </a:r>
-          </a:p>
-          <a:p>
-            <a:r>
-              <a:rPr lang="en-GB" sz="1400" b="1" dirty="0">
-                <a:latin typeface="Helvetica Neue"/>
-              </a:rPr>
-              <a:t>Oral Prednisolone 40mg </a:t>
-            </a:r>
-            <a:r>
-              <a:rPr lang="en-GB" sz="1400" b="1" dirty="0">
-                <a:latin typeface="Helvetica Neue"/>
-                <a:sym typeface="Symbol" panose="05050102010706020507" pitchFamily="18" charset="2"/>
-              </a:rPr>
-              <a:t>(tapering by 5mg/week)</a:t>
-            </a:r>
-            <a:endParaRPr lang="en-GB" sz="1350" b="1" dirty="0">
-              <a:solidFill>
-                <a:srgbClr val="00B050"/>
-              </a:solidFill>
+            <a:endParaRPr lang="en-GB" sz="1400" b="1" dirty="0">
               <a:latin typeface="Helvetica Neue"/>
               <a:sym typeface="Symbol" panose="05050102010706020507" pitchFamily="18" charset="2"/>
             </a:endParaRPr>
@@ -4186,15 +4156,18 @@
         </p:nvCxnSpPr>
         <p:spPr>
           <a:xfrm>
-            <a:off x="3067051" y="3371939"/>
-            <a:ext cx="1422399" cy="0"/>
+            <a:off x="3067051" y="3206839"/>
+            <a:ext cx="1212849" cy="0"/>
           </a:xfrm>
           <a:prstGeom prst="line">
             <a:avLst/>
           </a:prstGeom>
           <a:ln w="76200">
             <a:solidFill>
-              <a:srgbClr val="008000"/>
+              <a:schemeClr val="tx1">
+                <a:lumMod val="75000"/>
+                <a:lumOff val="25000"/>
+              </a:schemeClr>
             </a:solidFill>
           </a:ln>
         </p:spPr>
@@ -4221,7 +4194,7 @@
         </p:nvSpPr>
         <p:spPr>
           <a:xfrm>
-            <a:off x="4913427" y="3735209"/>
+            <a:off x="4735627" y="3852342"/>
             <a:ext cx="798552" cy="307777"/>
           </a:xfrm>
           <a:prstGeom prst="rect">
@@ -4252,7 +4225,7 @@
         </p:nvCxnSpPr>
         <p:spPr>
           <a:xfrm flipV="1">
-            <a:off x="1564650" y="3478681"/>
+            <a:off x="1564650" y="3080064"/>
             <a:ext cx="1443037" cy="2918"/>
           </a:xfrm>
           <a:prstGeom prst="line">
@@ -4260,10 +4233,7 @@
           </a:prstGeom>
           <a:ln w="76200">
             <a:solidFill>
-              <a:schemeClr val="tx1">
-                <a:lumMod val="75000"/>
-                <a:lumOff val="25000"/>
-              </a:schemeClr>
+              <a:srgbClr val="008000"/>
             </a:solidFill>
             <a:prstDash val="sysDot"/>
           </a:ln>
@@ -4286,12 +4256,14 @@
       <p:cxnSp>
         <p:nvCxnSpPr>
           <p:cNvPr id="20" name="Straight Connector 19"/>
-          <p:cNvCxnSpPr/>
+          <p:cNvCxnSpPr>
+            <a:cxnSpLocks/>
+          </p:cNvCxnSpPr>
           <p:nvPr/>
         </p:nvCxnSpPr>
         <p:spPr>
           <a:xfrm>
-            <a:off x="3104014" y="3441358"/>
+            <a:off x="3104014" y="3558491"/>
             <a:ext cx="0" cy="266700"/>
           </a:xfrm>
           <a:prstGeom prst="line">
@@ -4329,7 +4301,7 @@
         </p:nvCxnSpPr>
         <p:spPr>
           <a:xfrm>
-            <a:off x="5302348" y="3457575"/>
+            <a:off x="5124548" y="3574708"/>
             <a:ext cx="0" cy="266700"/>
           </a:xfrm>
           <a:prstGeom prst="line">
@@ -4367,7 +4339,7 @@
         </p:nvCxnSpPr>
         <p:spPr>
           <a:xfrm>
-            <a:off x="6491288" y="3457575"/>
+            <a:off x="6313488" y="3574708"/>
             <a:ext cx="0" cy="266700"/>
           </a:xfrm>
           <a:prstGeom prst="line">
@@ -4400,12 +4372,14 @@
       <p:cxnSp>
         <p:nvCxnSpPr>
           <p:cNvPr id="24" name="Straight Connector 23"/>
-          <p:cNvCxnSpPr/>
+          <p:cNvCxnSpPr>
+            <a:cxnSpLocks/>
+          </p:cNvCxnSpPr>
           <p:nvPr/>
         </p:nvCxnSpPr>
         <p:spPr>
           <a:xfrm>
-            <a:off x="8991600" y="3448050"/>
+            <a:off x="8991600" y="3565183"/>
             <a:ext cx="0" cy="266700"/>
           </a:xfrm>
           <a:prstGeom prst="line">
@@ -4490,15 +4464,18 @@
         </p:nvCxnSpPr>
         <p:spPr>
           <a:xfrm>
-            <a:off x="4489450" y="3371939"/>
-            <a:ext cx="1055726" cy="0"/>
+            <a:off x="4191212" y="3206839"/>
+            <a:ext cx="1022024" cy="0"/>
           </a:xfrm>
           <a:prstGeom prst="line">
             <a:avLst/>
           </a:prstGeom>
           <a:ln w="76200">
             <a:solidFill>
-              <a:srgbClr val="008000"/>
+              <a:schemeClr val="tx1">
+                <a:lumMod val="75000"/>
+                <a:lumOff val="25000"/>
+              </a:schemeClr>
             </a:solidFill>
             <a:prstDash val="sysDot"/>
           </a:ln>
@@ -4532,7 +4509,7 @@
         </p:nvSpPr>
         <p:spPr>
           <a:xfrm>
-            <a:off x="2704738" y="3725685"/>
+            <a:off x="2704738" y="3842818"/>
             <a:ext cx="798552" cy="307777"/>
           </a:xfrm>
           <a:prstGeom prst="rect">
@@ -4569,7 +4546,7 @@
         </p:nvSpPr>
         <p:spPr>
           <a:xfrm>
-            <a:off x="6042319" y="3732693"/>
+            <a:off x="5864519" y="3849826"/>
             <a:ext cx="897938" cy="307777"/>
           </a:xfrm>
           <a:prstGeom prst="rect">
@@ -4606,7 +4583,7 @@
         </p:nvSpPr>
         <p:spPr>
           <a:xfrm>
-            <a:off x="8542631" y="3730268"/>
+            <a:off x="8542631" y="3847401"/>
             <a:ext cx="897938" cy="307777"/>
           </a:xfrm>
           <a:prstGeom prst="rect">
@@ -4659,6 +4636,57 @@
           </a:prstGeom>
         </p:spPr>
       </p:pic>
+      <p:sp>
+        <p:nvSpPr>
+          <p:cNvPr id="29" name="TextBox 28">
+            <a:extLst>
+              <a:ext uri="{FF2B5EF4-FFF2-40B4-BE49-F238E27FC236}">
+                <a16:creationId xmlns:a16="http://schemas.microsoft.com/office/drawing/2014/main" id="{5F0A2E46-5FB4-4956-8221-03DD0EC40218}"/>
+              </a:ext>
+            </a:extLst>
+          </p:cNvPr>
+          <p:cNvSpPr txBox="1"/>
+          <p:nvPr/>
+        </p:nvSpPr>
+        <p:spPr>
+          <a:xfrm>
+            <a:off x="3033973" y="3245070"/>
+            <a:ext cx="6096000" cy="307777"/>
+          </a:xfrm>
+          <a:prstGeom prst="rect">
+            <a:avLst/>
+          </a:prstGeom>
+          <a:noFill/>
+        </p:spPr>
+        <p:txBody>
+          <a:bodyPr wrap="square">
+            <a:spAutoFit/>
+          </a:bodyPr>
+          <a:lstStyle/>
+          <a:p>
+            <a:r>
+              <a:rPr lang="en-GB" sz="1400" b="1" dirty="0">
+                <a:latin typeface="Helvetica Neue"/>
+              </a:rPr>
+              <a:t>Oral Prednisolone 40mg </a:t>
+            </a:r>
+            <a:r>
+              <a:rPr lang="en-GB" sz="1400" b="1" dirty="0">
+                <a:latin typeface="Helvetica Neue"/>
+                <a:sym typeface="Symbol" panose="05050102010706020507" pitchFamily="18" charset="2"/>
+              </a:rPr>
+              <a:t>(tapering by 5mg/week)</a:t>
+            </a:r>
+            <a:endParaRPr lang="en-GB" sz="1400" b="1" dirty="0">
+              <a:solidFill>
+                <a:srgbClr val="00B050"/>
+              </a:solidFill>
+              <a:latin typeface="Helvetica Neue"/>
+              <a:sym typeface="Symbol" panose="05050102010706020507" pitchFamily="18" charset="2"/>
+            </a:endParaRPr>
+          </a:p>
+        </p:txBody>
+      </p:sp>
     </p:spTree>
     <p:extLst>
       <p:ext uri="{BB962C8B-B14F-4D97-AF65-F5344CB8AC3E}">

</xml_diff>

<commit_message>
add youtube embed and update minimarvel contact details
</commit_message>
<xml_diff>
--- a/design/Marvel Icon.pptx
+++ b/design/Marvel Icon.pptx
@@ -5,7 +5,7 @@
     <p:sldMasterId id="2147483648" r:id="rId1"/>
   </p:sldMasterIdLst>
   <p:notesMasterIdLst>
-    <p:notesMasterId r:id="rId9"/>
+    <p:notesMasterId r:id="rId10"/>
   </p:notesMasterIdLst>
   <p:sldIdLst>
     <p:sldId id="262" r:id="rId2"/>
@@ -13,8 +13,9 @@
     <p:sldId id="277" r:id="rId4"/>
     <p:sldId id="278" r:id="rId5"/>
     <p:sldId id="259" r:id="rId6"/>
-    <p:sldId id="269" r:id="rId7"/>
-    <p:sldId id="270" r:id="rId8"/>
+    <p:sldId id="279" r:id="rId7"/>
+    <p:sldId id="269" r:id="rId8"/>
+    <p:sldId id="270" r:id="rId9"/>
   </p:sldIdLst>
   <p:sldSz cx="12192000" cy="6858000"/>
   <p:notesSz cx="6858000" cy="9144000"/>
@@ -214,7 +215,7 @@
           <a:p>
             <a:fld id="{53A2C0CD-0C98-644B-B761-F97DDC04F59E}" type="datetimeFigureOut">
               <a:rPr lang="en-US" smtClean="0"/>
-              <a:t>10/20/2022</a:t>
+              <a:t>10/24/2022</a:t>
             </a:fld>
             <a:endParaRPr lang="en-US"/>
           </a:p>
@@ -663,7 +664,7 @@
           <a:p>
             <a:fld id="{B4E1D56B-60CF-8C4B-97C0-D25BCDB18721}" type="datetimeFigureOut">
               <a:rPr lang="en-US" smtClean="0"/>
-              <a:t>10/20/2022</a:t>
+              <a:t>10/24/2022</a:t>
             </a:fld>
             <a:endParaRPr lang="en-US"/>
           </a:p>
@@ -833,7 +834,7 @@
           <a:p>
             <a:fld id="{B4E1D56B-60CF-8C4B-97C0-D25BCDB18721}" type="datetimeFigureOut">
               <a:rPr lang="en-US" smtClean="0"/>
-              <a:t>10/20/2022</a:t>
+              <a:t>10/24/2022</a:t>
             </a:fld>
             <a:endParaRPr lang="en-US"/>
           </a:p>
@@ -1013,7 +1014,7 @@
           <a:p>
             <a:fld id="{B4E1D56B-60CF-8C4B-97C0-D25BCDB18721}" type="datetimeFigureOut">
               <a:rPr lang="en-US" smtClean="0"/>
-              <a:t>10/20/2022</a:t>
+              <a:t>10/24/2022</a:t>
             </a:fld>
             <a:endParaRPr lang="en-US"/>
           </a:p>
@@ -1183,7 +1184,7 @@
           <a:p>
             <a:fld id="{B4E1D56B-60CF-8C4B-97C0-D25BCDB18721}" type="datetimeFigureOut">
               <a:rPr lang="en-US" smtClean="0"/>
-              <a:t>10/20/2022</a:t>
+              <a:t>10/24/2022</a:t>
             </a:fld>
             <a:endParaRPr lang="en-US"/>
           </a:p>
@@ -1429,7 +1430,7 @@
           <a:p>
             <a:fld id="{B4E1D56B-60CF-8C4B-97C0-D25BCDB18721}" type="datetimeFigureOut">
               <a:rPr lang="en-US" smtClean="0"/>
-              <a:t>10/20/2022</a:t>
+              <a:t>10/24/2022</a:t>
             </a:fld>
             <a:endParaRPr lang="en-US"/>
           </a:p>
@@ -1717,7 +1718,7 @@
           <a:p>
             <a:fld id="{B4E1D56B-60CF-8C4B-97C0-D25BCDB18721}" type="datetimeFigureOut">
               <a:rPr lang="en-US" smtClean="0"/>
-              <a:t>10/20/2022</a:t>
+              <a:t>10/24/2022</a:t>
             </a:fld>
             <a:endParaRPr lang="en-US"/>
           </a:p>
@@ -2139,7 +2140,7 @@
           <a:p>
             <a:fld id="{B4E1D56B-60CF-8C4B-97C0-D25BCDB18721}" type="datetimeFigureOut">
               <a:rPr lang="en-US" smtClean="0"/>
-              <a:t>10/20/2022</a:t>
+              <a:t>10/24/2022</a:t>
             </a:fld>
             <a:endParaRPr lang="en-US"/>
           </a:p>
@@ -2257,7 +2258,7 @@
           <a:p>
             <a:fld id="{B4E1D56B-60CF-8C4B-97C0-D25BCDB18721}" type="datetimeFigureOut">
               <a:rPr lang="en-US" smtClean="0"/>
-              <a:t>10/20/2022</a:t>
+              <a:t>10/24/2022</a:t>
             </a:fld>
             <a:endParaRPr lang="en-US"/>
           </a:p>
@@ -2352,7 +2353,7 @@
           <a:p>
             <a:fld id="{B4E1D56B-60CF-8C4B-97C0-D25BCDB18721}" type="datetimeFigureOut">
               <a:rPr lang="en-US" smtClean="0"/>
-              <a:t>10/20/2022</a:t>
+              <a:t>10/24/2022</a:t>
             </a:fld>
             <a:endParaRPr lang="en-US"/>
           </a:p>
@@ -2629,7 +2630,7 @@
           <a:p>
             <a:fld id="{B4E1D56B-60CF-8C4B-97C0-D25BCDB18721}" type="datetimeFigureOut">
               <a:rPr lang="en-US" smtClean="0"/>
-              <a:t>10/20/2022</a:t>
+              <a:t>10/24/2022</a:t>
             </a:fld>
             <a:endParaRPr lang="en-US"/>
           </a:p>
@@ -2882,7 +2883,7 @@
           <a:p>
             <a:fld id="{B4E1D56B-60CF-8C4B-97C0-D25BCDB18721}" type="datetimeFigureOut">
               <a:rPr lang="en-US" smtClean="0"/>
-              <a:t>10/20/2022</a:t>
+              <a:t>10/24/2022</a:t>
             </a:fld>
             <a:endParaRPr lang="en-US"/>
           </a:p>
@@ -3095,7 +3096,7 @@
           <a:p>
             <a:fld id="{B4E1D56B-60CF-8C4B-97C0-D25BCDB18721}" type="datetimeFigureOut">
               <a:rPr lang="en-US" smtClean="0"/>
-              <a:t>10/20/2022</a:t>
+              <a:t>10/24/2022</a:t>
             </a:fld>
             <a:endParaRPr lang="en-US"/>
           </a:p>
@@ -5240,6 +5241,1177 @@
           <a:chExt cx="0" cy="0"/>
         </a:xfrm>
       </p:grpSpPr>
+      <p:cxnSp>
+        <p:nvCxnSpPr>
+          <p:cNvPr id="2" name="Straight Arrow Connector 1"/>
+          <p:cNvCxnSpPr/>
+          <p:nvPr/>
+        </p:nvCxnSpPr>
+        <p:spPr>
+          <a:xfrm flipV="1">
+            <a:off x="3067051" y="2694425"/>
+            <a:ext cx="6886575" cy="2055"/>
+          </a:xfrm>
+          <a:prstGeom prst="straightConnector1">
+            <a:avLst/>
+          </a:prstGeom>
+          <a:ln w="76200">
+            <a:solidFill>
+              <a:srgbClr val="008000"/>
+            </a:solidFill>
+            <a:tailEnd type="triangle"/>
+          </a:ln>
+        </p:spPr>
+        <p:style>
+          <a:lnRef idx="1">
+            <a:schemeClr val="accent1"/>
+          </a:lnRef>
+          <a:fillRef idx="0">
+            <a:schemeClr val="accent1"/>
+          </a:fillRef>
+          <a:effectRef idx="0">
+            <a:schemeClr val="accent1"/>
+          </a:effectRef>
+          <a:fontRef idx="minor">
+            <a:schemeClr val="tx1"/>
+          </a:fontRef>
+        </p:style>
+      </p:cxnSp>
+      <p:sp>
+        <p:nvSpPr>
+          <p:cNvPr id="4" name="TextBox 3"/>
+          <p:cNvSpPr txBox="1"/>
+          <p:nvPr/>
+        </p:nvSpPr>
+        <p:spPr>
+          <a:xfrm>
+            <a:off x="2911978" y="3943285"/>
+            <a:ext cx="1627369" cy="507831"/>
+          </a:xfrm>
+          <a:prstGeom prst="rect">
+            <a:avLst/>
+          </a:prstGeom>
+          <a:noFill/>
+        </p:spPr>
+        <p:txBody>
+          <a:bodyPr wrap="none" rtlCol="0">
+            <a:spAutoFit/>
+          </a:bodyPr>
+          <a:lstStyle/>
+          <a:p>
+            <a:r>
+              <a:rPr lang="en-GB" sz="1350" b="1" dirty="0">
+                <a:latin typeface="Helvetica Neue"/>
+                <a:sym typeface="Symbol" panose="05050102010706020507" pitchFamily="18" charset="2"/>
+              </a:rPr>
+              <a:t>Primary Endpoint</a:t>
+            </a:r>
+          </a:p>
+          <a:p>
+            <a:r>
+              <a:rPr lang="en-GB" sz="1350" dirty="0">
+                <a:latin typeface="Helvetica Neue"/>
+              </a:rPr>
+              <a:t>Feasibility</a:t>
+            </a:r>
+          </a:p>
+        </p:txBody>
+      </p:sp>
+      <p:sp>
+        <p:nvSpPr>
+          <p:cNvPr id="7" name="TextBox 6"/>
+          <p:cNvSpPr txBox="1"/>
+          <p:nvPr/>
+        </p:nvSpPr>
+        <p:spPr>
+          <a:xfrm>
+            <a:off x="4711615" y="3943285"/>
+            <a:ext cx="1867819" cy="923330"/>
+          </a:xfrm>
+          <a:prstGeom prst="rect">
+            <a:avLst/>
+          </a:prstGeom>
+          <a:noFill/>
+        </p:spPr>
+        <p:txBody>
+          <a:bodyPr wrap="none" rtlCol="0">
+            <a:spAutoFit/>
+          </a:bodyPr>
+          <a:lstStyle/>
+          <a:p>
+            <a:r>
+              <a:rPr lang="en-GB" sz="1350" b="1" dirty="0">
+                <a:latin typeface="Helvetica Neue"/>
+              </a:rPr>
+              <a:t>Secondary </a:t>
+            </a:r>
+            <a:r>
+              <a:rPr lang="en-GB" sz="1350" b="1" dirty="0">
+                <a:latin typeface="Helvetica Neue"/>
+                <a:sym typeface="Symbol" panose="05050102010706020507" pitchFamily="18" charset="2"/>
+              </a:rPr>
+              <a:t>Endpoint</a:t>
+            </a:r>
+          </a:p>
+          <a:p>
+            <a:r>
+              <a:rPr lang="en-GB" sz="1350" dirty="0">
+                <a:latin typeface="Helvetica Neue"/>
+              </a:rPr>
+              <a:t>PUCAI Score</a:t>
+            </a:r>
+          </a:p>
+          <a:p>
+            <a:r>
+              <a:rPr lang="en-GB" sz="1350" dirty="0">
+                <a:latin typeface="Helvetica Neue"/>
+              </a:rPr>
+              <a:t>Clinical Response</a:t>
+            </a:r>
+          </a:p>
+          <a:p>
+            <a:r>
+              <a:rPr lang="en-GB" sz="1350" dirty="0">
+                <a:latin typeface="Helvetica Neue"/>
+              </a:rPr>
+              <a:t>Steroid Burden</a:t>
+            </a:r>
+          </a:p>
+        </p:txBody>
+      </p:sp>
+      <p:sp>
+        <p:nvSpPr>
+          <p:cNvPr id="9" name="TextBox 8"/>
+          <p:cNvSpPr txBox="1"/>
+          <p:nvPr/>
+        </p:nvSpPr>
+        <p:spPr>
+          <a:xfrm>
+            <a:off x="3033973" y="2342641"/>
+            <a:ext cx="5511403" cy="307777"/>
+          </a:xfrm>
+          <a:prstGeom prst="rect">
+            <a:avLst/>
+          </a:prstGeom>
+          <a:noFill/>
+        </p:spPr>
+        <p:txBody>
+          <a:bodyPr wrap="square" rtlCol="0">
+            <a:spAutoFit/>
+          </a:bodyPr>
+          <a:lstStyle/>
+          <a:p>
+            <a:r>
+              <a:rPr lang="en-GB" sz="1400" b="1" dirty="0">
+                <a:solidFill>
+                  <a:srgbClr val="008000"/>
+                </a:solidFill>
+                <a:latin typeface="Helvetica Neue"/>
+              </a:rPr>
+              <a:t>Mitochondrial antioxidant vs placebo (24 weeks duration)</a:t>
+            </a:r>
+            <a:endParaRPr lang="en-GB" sz="1400" b="1" dirty="0">
+              <a:latin typeface="Helvetica Neue"/>
+              <a:sym typeface="Symbol" panose="05050102010706020507" pitchFamily="18" charset="2"/>
+            </a:endParaRPr>
+          </a:p>
+        </p:txBody>
+      </p:sp>
+      <p:sp>
+        <p:nvSpPr>
+          <p:cNvPr id="10" name="TextBox 9"/>
+          <p:cNvSpPr txBox="1"/>
+          <p:nvPr/>
+        </p:nvSpPr>
+        <p:spPr>
+          <a:xfrm>
+            <a:off x="1482100" y="1527779"/>
+            <a:ext cx="3057247" cy="461665"/>
+          </a:xfrm>
+          <a:prstGeom prst="rect">
+            <a:avLst/>
+          </a:prstGeom>
+          <a:noFill/>
+          <a:ln w="38100">
+            <a:solidFill>
+              <a:schemeClr val="tx1">
+                <a:lumMod val="75000"/>
+                <a:lumOff val="25000"/>
+              </a:schemeClr>
+            </a:solidFill>
+          </a:ln>
+        </p:spPr>
+        <p:txBody>
+          <a:bodyPr wrap="none" rtlCol="0">
+            <a:spAutoFit/>
+          </a:bodyPr>
+          <a:lstStyle/>
+          <a:p>
+            <a:r>
+              <a:rPr lang="en-GB" sz="2400" b="1" dirty="0">
+                <a:latin typeface="Helvetica Neue"/>
+                <a:sym typeface="Symbol" panose="05050102010706020507" pitchFamily="18" charset="2"/>
+              </a:rPr>
+              <a:t>UC Flare or new UC</a:t>
+            </a:r>
+          </a:p>
+        </p:txBody>
+      </p:sp>
+      <p:cxnSp>
+        <p:nvCxnSpPr>
+          <p:cNvPr id="13" name="Straight Connector 12"/>
+          <p:cNvCxnSpPr>
+            <a:cxnSpLocks/>
+          </p:cNvCxnSpPr>
+          <p:nvPr/>
+        </p:nvCxnSpPr>
+        <p:spPr>
+          <a:xfrm>
+            <a:off x="3067051" y="2823255"/>
+            <a:ext cx="1212849" cy="0"/>
+          </a:xfrm>
+          <a:prstGeom prst="line">
+            <a:avLst/>
+          </a:prstGeom>
+          <a:ln w="76200">
+            <a:solidFill>
+              <a:schemeClr val="tx1">
+                <a:lumMod val="75000"/>
+                <a:lumOff val="25000"/>
+              </a:schemeClr>
+            </a:solidFill>
+          </a:ln>
+        </p:spPr>
+        <p:style>
+          <a:lnRef idx="1">
+            <a:schemeClr val="accent1"/>
+          </a:lnRef>
+          <a:fillRef idx="0">
+            <a:schemeClr val="accent1"/>
+          </a:fillRef>
+          <a:effectRef idx="0">
+            <a:schemeClr val="accent1"/>
+          </a:effectRef>
+          <a:fontRef idx="minor">
+            <a:schemeClr val="tx1"/>
+          </a:fontRef>
+        </p:style>
+      </p:cxnSp>
+      <p:cxnSp>
+        <p:nvCxnSpPr>
+          <p:cNvPr id="17" name="Straight Connector 16"/>
+          <p:cNvCxnSpPr/>
+          <p:nvPr/>
+        </p:nvCxnSpPr>
+        <p:spPr>
+          <a:xfrm flipV="1">
+            <a:off x="1564650" y="2696480"/>
+            <a:ext cx="1443037" cy="2918"/>
+          </a:xfrm>
+          <a:prstGeom prst="line">
+            <a:avLst/>
+          </a:prstGeom>
+          <a:ln w="76200">
+            <a:solidFill>
+              <a:srgbClr val="008000"/>
+            </a:solidFill>
+            <a:prstDash val="sysDot"/>
+          </a:ln>
+        </p:spPr>
+        <p:style>
+          <a:lnRef idx="1">
+            <a:schemeClr val="accent1"/>
+          </a:lnRef>
+          <a:fillRef idx="0">
+            <a:schemeClr val="accent1"/>
+          </a:fillRef>
+          <a:effectRef idx="0">
+            <a:schemeClr val="accent1"/>
+          </a:effectRef>
+          <a:fontRef idx="minor">
+            <a:schemeClr val="tx1"/>
+          </a:fontRef>
+        </p:style>
+      </p:cxnSp>
+      <p:cxnSp>
+        <p:nvCxnSpPr>
+          <p:cNvPr id="20" name="Straight Connector 19"/>
+          <p:cNvCxnSpPr>
+            <a:cxnSpLocks/>
+          </p:cNvCxnSpPr>
+          <p:nvPr/>
+        </p:nvCxnSpPr>
+        <p:spPr>
+          <a:xfrm>
+            <a:off x="3104014" y="3189497"/>
+            <a:ext cx="0" cy="266700"/>
+          </a:xfrm>
+          <a:prstGeom prst="line">
+            <a:avLst/>
+          </a:prstGeom>
+          <a:ln w="76200">
+            <a:solidFill>
+              <a:schemeClr val="tx1">
+                <a:lumMod val="75000"/>
+                <a:lumOff val="25000"/>
+              </a:schemeClr>
+            </a:solidFill>
+          </a:ln>
+        </p:spPr>
+        <p:style>
+          <a:lnRef idx="1">
+            <a:schemeClr val="accent1"/>
+          </a:lnRef>
+          <a:fillRef idx="0">
+            <a:schemeClr val="accent1"/>
+          </a:fillRef>
+          <a:effectRef idx="0">
+            <a:schemeClr val="accent1"/>
+          </a:effectRef>
+          <a:fontRef idx="minor">
+            <a:schemeClr val="tx1"/>
+          </a:fontRef>
+        </p:style>
+      </p:cxnSp>
+      <p:cxnSp>
+        <p:nvCxnSpPr>
+          <p:cNvPr id="22" name="Straight Connector 21"/>
+          <p:cNvCxnSpPr/>
+          <p:nvPr/>
+        </p:nvCxnSpPr>
+        <p:spPr>
+          <a:xfrm>
+            <a:off x="6313488" y="3200952"/>
+            <a:ext cx="0" cy="266700"/>
+          </a:xfrm>
+          <a:prstGeom prst="line">
+            <a:avLst/>
+          </a:prstGeom>
+          <a:ln w="76200">
+            <a:solidFill>
+              <a:schemeClr val="tx1">
+                <a:lumMod val="75000"/>
+                <a:lumOff val="25000"/>
+              </a:schemeClr>
+            </a:solidFill>
+          </a:ln>
+        </p:spPr>
+        <p:style>
+          <a:lnRef idx="1">
+            <a:schemeClr val="accent1"/>
+          </a:lnRef>
+          <a:fillRef idx="0">
+            <a:schemeClr val="accent1"/>
+          </a:fillRef>
+          <a:effectRef idx="0">
+            <a:schemeClr val="accent1"/>
+          </a:effectRef>
+          <a:fontRef idx="minor">
+            <a:schemeClr val="tx1"/>
+          </a:fontRef>
+        </p:style>
+      </p:cxnSp>
+      <p:cxnSp>
+        <p:nvCxnSpPr>
+          <p:cNvPr id="24" name="Straight Connector 23"/>
+          <p:cNvCxnSpPr>
+            <a:cxnSpLocks/>
+          </p:cNvCxnSpPr>
+          <p:nvPr/>
+        </p:nvCxnSpPr>
+        <p:spPr>
+          <a:xfrm>
+            <a:off x="9181071" y="3189497"/>
+            <a:ext cx="0" cy="266700"/>
+          </a:xfrm>
+          <a:prstGeom prst="line">
+            <a:avLst/>
+          </a:prstGeom>
+          <a:ln w="76200">
+            <a:solidFill>
+              <a:schemeClr val="tx1">
+                <a:lumMod val="75000"/>
+                <a:lumOff val="25000"/>
+              </a:schemeClr>
+            </a:solidFill>
+          </a:ln>
+        </p:spPr>
+        <p:style>
+          <a:lnRef idx="1">
+            <a:schemeClr val="accent1"/>
+          </a:lnRef>
+          <a:fillRef idx="0">
+            <a:schemeClr val="accent1"/>
+          </a:fillRef>
+          <a:effectRef idx="0">
+            <a:schemeClr val="accent1"/>
+          </a:effectRef>
+          <a:fontRef idx="minor">
+            <a:schemeClr val="tx1"/>
+          </a:fontRef>
+        </p:style>
+      </p:cxnSp>
+      <p:sp>
+        <p:nvSpPr>
+          <p:cNvPr id="26" name="TextBox 25"/>
+          <p:cNvSpPr txBox="1"/>
+          <p:nvPr/>
+        </p:nvSpPr>
+        <p:spPr>
+          <a:xfrm>
+            <a:off x="1482100" y="2112946"/>
+            <a:ext cx="1386918" cy="523220"/>
+          </a:xfrm>
+          <a:prstGeom prst="rect">
+            <a:avLst/>
+          </a:prstGeom>
+          <a:noFill/>
+        </p:spPr>
+        <p:txBody>
+          <a:bodyPr wrap="none" rtlCol="0">
+            <a:spAutoFit/>
+          </a:bodyPr>
+          <a:lstStyle/>
+          <a:p>
+            <a:r>
+              <a:rPr lang="en-GB" sz="1400" b="1" dirty="0">
+                <a:solidFill>
+                  <a:srgbClr val="008000"/>
+                </a:solidFill>
+                <a:latin typeface="Helvetica Neue"/>
+              </a:rPr>
+              <a:t>Screening</a:t>
+            </a:r>
+          </a:p>
+          <a:p>
+            <a:r>
+              <a:rPr lang="en-GB" sz="1400" b="1" dirty="0">
+                <a:solidFill>
+                  <a:srgbClr val="008000"/>
+                </a:solidFill>
+                <a:latin typeface="Helvetica Neue"/>
+              </a:rPr>
+              <a:t>(Max 2 weeks)</a:t>
+            </a:r>
+          </a:p>
+        </p:txBody>
+      </p:sp>
+      <p:cxnSp>
+        <p:nvCxnSpPr>
+          <p:cNvPr id="28" name="Straight Connector 27"/>
+          <p:cNvCxnSpPr>
+            <a:cxnSpLocks/>
+          </p:cNvCxnSpPr>
+          <p:nvPr/>
+        </p:nvCxnSpPr>
+        <p:spPr>
+          <a:xfrm>
+            <a:off x="4191212" y="2823255"/>
+            <a:ext cx="1022024" cy="0"/>
+          </a:xfrm>
+          <a:prstGeom prst="line">
+            <a:avLst/>
+          </a:prstGeom>
+          <a:ln w="76200">
+            <a:solidFill>
+              <a:schemeClr val="tx1">
+                <a:lumMod val="75000"/>
+                <a:lumOff val="25000"/>
+              </a:schemeClr>
+            </a:solidFill>
+            <a:prstDash val="sysDot"/>
+          </a:ln>
+        </p:spPr>
+        <p:style>
+          <a:lnRef idx="1">
+            <a:schemeClr val="accent1"/>
+          </a:lnRef>
+          <a:fillRef idx="0">
+            <a:schemeClr val="accent1"/>
+          </a:fillRef>
+          <a:effectRef idx="0">
+            <a:schemeClr val="accent1"/>
+          </a:effectRef>
+          <a:fontRef idx="minor">
+            <a:schemeClr val="tx1"/>
+          </a:fontRef>
+        </p:style>
+      </p:cxnSp>
+      <p:sp>
+        <p:nvSpPr>
+          <p:cNvPr id="23" name="TextBox 22">
+            <a:extLst>
+              <a:ext uri="{FF2B5EF4-FFF2-40B4-BE49-F238E27FC236}">
+                <a16:creationId xmlns:a16="http://schemas.microsoft.com/office/drawing/2014/main" id="{29092CA0-D2E9-44A7-B025-6CDDAAA1A48F}"/>
+              </a:ext>
+            </a:extLst>
+          </p:cNvPr>
+          <p:cNvSpPr txBox="1"/>
+          <p:nvPr/>
+        </p:nvSpPr>
+        <p:spPr>
+          <a:xfrm>
+            <a:off x="2704738" y="3473824"/>
+            <a:ext cx="798552" cy="307777"/>
+          </a:xfrm>
+          <a:prstGeom prst="rect">
+            <a:avLst/>
+          </a:prstGeom>
+          <a:noFill/>
+        </p:spPr>
+        <p:txBody>
+          <a:bodyPr wrap="none" rtlCol="0">
+            <a:spAutoFit/>
+          </a:bodyPr>
+          <a:lstStyle/>
+          <a:p>
+            <a:r>
+              <a:rPr lang="en-GB" sz="1400" b="1" dirty="0">
+                <a:latin typeface="Helvetica Neue"/>
+              </a:rPr>
+              <a:t>Week 0</a:t>
+            </a:r>
+          </a:p>
+        </p:txBody>
+      </p:sp>
+      <p:sp>
+        <p:nvSpPr>
+          <p:cNvPr id="25" name="TextBox 24">
+            <a:extLst>
+              <a:ext uri="{FF2B5EF4-FFF2-40B4-BE49-F238E27FC236}">
+                <a16:creationId xmlns:a16="http://schemas.microsoft.com/office/drawing/2014/main" id="{9C6DBEE7-487D-4484-BFBE-A2A0C1026283}"/>
+              </a:ext>
+            </a:extLst>
+          </p:cNvPr>
+          <p:cNvSpPr txBox="1"/>
+          <p:nvPr/>
+        </p:nvSpPr>
+        <p:spPr>
+          <a:xfrm>
+            <a:off x="5864519" y="3476070"/>
+            <a:ext cx="897938" cy="307777"/>
+          </a:xfrm>
+          <a:prstGeom prst="rect">
+            <a:avLst/>
+          </a:prstGeom>
+          <a:noFill/>
+        </p:spPr>
+        <p:txBody>
+          <a:bodyPr wrap="none" rtlCol="0">
+            <a:spAutoFit/>
+          </a:bodyPr>
+          <a:lstStyle/>
+          <a:p>
+            <a:r>
+              <a:rPr lang="en-GB" sz="1400" b="1" dirty="0">
+                <a:latin typeface="Helvetica Neue"/>
+              </a:rPr>
+              <a:t>Week 12</a:t>
+            </a:r>
+          </a:p>
+        </p:txBody>
+      </p:sp>
+      <p:sp>
+        <p:nvSpPr>
+          <p:cNvPr id="27" name="TextBox 26">
+            <a:extLst>
+              <a:ext uri="{FF2B5EF4-FFF2-40B4-BE49-F238E27FC236}">
+                <a16:creationId xmlns:a16="http://schemas.microsoft.com/office/drawing/2014/main" id="{27A88243-9A9C-42AA-BF15-4351968AE3E6}"/>
+              </a:ext>
+            </a:extLst>
+          </p:cNvPr>
+          <p:cNvSpPr txBox="1"/>
+          <p:nvPr/>
+        </p:nvSpPr>
+        <p:spPr>
+          <a:xfrm>
+            <a:off x="8732102" y="3471715"/>
+            <a:ext cx="897938" cy="307777"/>
+          </a:xfrm>
+          <a:prstGeom prst="rect">
+            <a:avLst/>
+          </a:prstGeom>
+          <a:noFill/>
+        </p:spPr>
+        <p:txBody>
+          <a:bodyPr wrap="none" rtlCol="0">
+            <a:spAutoFit/>
+          </a:bodyPr>
+          <a:lstStyle/>
+          <a:p>
+            <a:r>
+              <a:rPr lang="en-GB" sz="1400" b="1" dirty="0">
+                <a:latin typeface="Helvetica Neue"/>
+              </a:rPr>
+              <a:t>Week 24</a:t>
+            </a:r>
+          </a:p>
+        </p:txBody>
+      </p:sp>
+      <p:pic>
+        <p:nvPicPr>
+          <p:cNvPr id="16" name="Picture 15" descr="A green and white sign&#10;&#10;Description automatically generated with medium confidence">
+            <a:extLst>
+              <a:ext uri="{FF2B5EF4-FFF2-40B4-BE49-F238E27FC236}">
+                <a16:creationId xmlns:a16="http://schemas.microsoft.com/office/drawing/2014/main" id="{AE85391A-382E-42A8-BCB5-236FBEE25656}"/>
+              </a:ext>
+            </a:extLst>
+          </p:cNvPr>
+          <p:cNvPicPr>
+            <a:picLocks noChangeAspect="1"/>
+          </p:cNvPicPr>
+          <p:nvPr/>
+        </p:nvPicPr>
+        <p:blipFill>
+          <a:blip r:embed="rId2"/>
+          <a:stretch>
+            <a:fillRect/>
+          </a:stretch>
+        </p:blipFill>
+        <p:spPr>
+          <a:xfrm>
+            <a:off x="8714952" y="1468297"/>
+            <a:ext cx="1238674" cy="580628"/>
+          </a:xfrm>
+          <a:prstGeom prst="rect">
+            <a:avLst/>
+          </a:prstGeom>
+        </p:spPr>
+      </p:pic>
+      <p:sp>
+        <p:nvSpPr>
+          <p:cNvPr id="29" name="TextBox 28">
+            <a:extLst>
+              <a:ext uri="{FF2B5EF4-FFF2-40B4-BE49-F238E27FC236}">
+                <a16:creationId xmlns:a16="http://schemas.microsoft.com/office/drawing/2014/main" id="{5F0A2E46-5FB4-4956-8221-03DD0EC40218}"/>
+              </a:ext>
+            </a:extLst>
+          </p:cNvPr>
+          <p:cNvSpPr txBox="1"/>
+          <p:nvPr/>
+        </p:nvSpPr>
+        <p:spPr>
+          <a:xfrm>
+            <a:off x="3033973" y="2861486"/>
+            <a:ext cx="6096000" cy="307777"/>
+          </a:xfrm>
+          <a:prstGeom prst="rect">
+            <a:avLst/>
+          </a:prstGeom>
+          <a:noFill/>
+        </p:spPr>
+        <p:txBody>
+          <a:bodyPr wrap="square">
+            <a:spAutoFit/>
+          </a:bodyPr>
+          <a:lstStyle/>
+          <a:p>
+            <a:r>
+              <a:rPr lang="en-GB" sz="1400" b="1" dirty="0">
+                <a:latin typeface="Helvetica Neue"/>
+              </a:rPr>
+              <a:t>Oral Prednisolone 40mg </a:t>
+            </a:r>
+            <a:r>
+              <a:rPr lang="en-GB" sz="1400" b="1" dirty="0">
+                <a:latin typeface="Helvetica Neue"/>
+                <a:sym typeface="Symbol" panose="05050102010706020507" pitchFamily="18" charset="2"/>
+              </a:rPr>
+              <a:t>(tapering by 5mg/week)</a:t>
+            </a:r>
+            <a:endParaRPr lang="en-GB" sz="1400" b="1" dirty="0">
+              <a:solidFill>
+                <a:srgbClr val="00B050"/>
+              </a:solidFill>
+              <a:latin typeface="Helvetica Neue"/>
+              <a:sym typeface="Symbol" panose="05050102010706020507" pitchFamily="18" charset="2"/>
+            </a:endParaRPr>
+          </a:p>
+        </p:txBody>
+      </p:sp>
+      <p:sp>
+        <p:nvSpPr>
+          <p:cNvPr id="31" name="Rectangle 30">
+            <a:extLst>
+              <a:ext uri="{FF2B5EF4-FFF2-40B4-BE49-F238E27FC236}">
+                <a16:creationId xmlns:a16="http://schemas.microsoft.com/office/drawing/2014/main" id="{B2550574-A2C0-9559-504B-52A53697CA6E}"/>
+              </a:ext>
+            </a:extLst>
+          </p:cNvPr>
+          <p:cNvSpPr/>
+          <p:nvPr/>
+        </p:nvSpPr>
+        <p:spPr>
+          <a:xfrm>
+            <a:off x="7745231" y="1490748"/>
+            <a:ext cx="1017769" cy="587293"/>
+          </a:xfrm>
+          <a:prstGeom prst="rect">
+            <a:avLst/>
+          </a:prstGeom>
+          <a:noFill/>
+          <a:ln>
+            <a:noFill/>
+          </a:ln>
+          <a:effectLst/>
+        </p:spPr>
+        <p:style>
+          <a:lnRef idx="1">
+            <a:schemeClr val="accent1"/>
+          </a:lnRef>
+          <a:fillRef idx="3">
+            <a:schemeClr val="accent1"/>
+          </a:fillRef>
+          <a:effectRef idx="2">
+            <a:schemeClr val="accent1"/>
+          </a:effectRef>
+          <a:fontRef idx="minor">
+            <a:schemeClr val="lt1"/>
+          </a:fontRef>
+        </p:style>
+        <p:txBody>
+          <a:bodyPr rtlCol="0" anchor="b"/>
+          <a:lstStyle/>
+          <a:p>
+            <a:pPr algn="ctr"/>
+            <a:r>
+              <a:rPr lang="en-US" sz="2800" b="1" dirty="0">
+                <a:solidFill>
+                  <a:schemeClr val="tx1"/>
+                </a:solidFill>
+                <a:latin typeface="Kristen ITC" panose="03050502040202030202" pitchFamily="66" charset="0"/>
+                <a:cs typeface="Helvetica Neue"/>
+              </a:rPr>
+              <a:t>mini-</a:t>
+            </a:r>
+            <a:endParaRPr lang="en-US" sz="3600" b="1" dirty="0">
+              <a:solidFill>
+                <a:schemeClr val="tx1"/>
+              </a:solidFill>
+              <a:latin typeface="Kristen ITC" panose="03050502040202030202" pitchFamily="66" charset="0"/>
+              <a:cs typeface="Helvetica Neue"/>
+            </a:endParaRPr>
+          </a:p>
+        </p:txBody>
+      </p:sp>
+      <p:sp>
+        <p:nvSpPr>
+          <p:cNvPr id="35" name="TextBox 34">
+            <a:extLst>
+              <a:ext uri="{FF2B5EF4-FFF2-40B4-BE49-F238E27FC236}">
+                <a16:creationId xmlns:a16="http://schemas.microsoft.com/office/drawing/2014/main" id="{F19B048B-25CB-59B4-2AA1-D7998F47D7BB}"/>
+              </a:ext>
+            </a:extLst>
+          </p:cNvPr>
+          <p:cNvSpPr txBox="1"/>
+          <p:nvPr/>
+        </p:nvSpPr>
+        <p:spPr>
+          <a:xfrm>
+            <a:off x="3501113" y="3471833"/>
+            <a:ext cx="798552" cy="307777"/>
+          </a:xfrm>
+          <a:prstGeom prst="rect">
+            <a:avLst/>
+          </a:prstGeom>
+          <a:noFill/>
+        </p:spPr>
+        <p:txBody>
+          <a:bodyPr wrap="none" rtlCol="0">
+            <a:spAutoFit/>
+          </a:bodyPr>
+          <a:lstStyle/>
+          <a:p>
+            <a:r>
+              <a:rPr lang="en-GB" sz="1400" b="1" dirty="0">
+                <a:latin typeface="Helvetica Neue"/>
+              </a:rPr>
+              <a:t>Week 3</a:t>
+            </a:r>
+          </a:p>
+        </p:txBody>
+      </p:sp>
+      <p:cxnSp>
+        <p:nvCxnSpPr>
+          <p:cNvPr id="36" name="Straight Connector 35">
+            <a:extLst>
+              <a:ext uri="{FF2B5EF4-FFF2-40B4-BE49-F238E27FC236}">
+                <a16:creationId xmlns:a16="http://schemas.microsoft.com/office/drawing/2014/main" id="{7BA85D08-8035-E9B2-6548-1069790422CF}"/>
+              </a:ext>
+            </a:extLst>
+          </p:cNvPr>
+          <p:cNvCxnSpPr/>
+          <p:nvPr/>
+        </p:nvCxnSpPr>
+        <p:spPr>
+          <a:xfrm>
+            <a:off x="3890034" y="3194199"/>
+            <a:ext cx="0" cy="266700"/>
+          </a:xfrm>
+          <a:prstGeom prst="line">
+            <a:avLst/>
+          </a:prstGeom>
+          <a:ln w="76200">
+            <a:solidFill>
+              <a:schemeClr val="tx1">
+                <a:lumMod val="75000"/>
+                <a:lumOff val="25000"/>
+              </a:schemeClr>
+            </a:solidFill>
+          </a:ln>
+        </p:spPr>
+        <p:style>
+          <a:lnRef idx="1">
+            <a:schemeClr val="accent1"/>
+          </a:lnRef>
+          <a:fillRef idx="0">
+            <a:schemeClr val="accent1"/>
+          </a:fillRef>
+          <a:effectRef idx="0">
+            <a:schemeClr val="accent1"/>
+          </a:effectRef>
+          <a:fontRef idx="minor">
+            <a:schemeClr val="tx1"/>
+          </a:fontRef>
+        </p:style>
+      </p:cxnSp>
+      <p:sp>
+        <p:nvSpPr>
+          <p:cNvPr id="37" name="TextBox 36">
+            <a:extLst>
+              <a:ext uri="{FF2B5EF4-FFF2-40B4-BE49-F238E27FC236}">
+                <a16:creationId xmlns:a16="http://schemas.microsoft.com/office/drawing/2014/main" id="{7EBA0F7B-A92B-95C9-9B51-C8552DBAA73E}"/>
+              </a:ext>
+            </a:extLst>
+          </p:cNvPr>
+          <p:cNvSpPr txBox="1"/>
+          <p:nvPr/>
+        </p:nvSpPr>
+        <p:spPr>
+          <a:xfrm>
+            <a:off x="4304288" y="3477842"/>
+            <a:ext cx="798552" cy="307777"/>
+          </a:xfrm>
+          <a:prstGeom prst="rect">
+            <a:avLst/>
+          </a:prstGeom>
+          <a:noFill/>
+        </p:spPr>
+        <p:txBody>
+          <a:bodyPr wrap="none" rtlCol="0">
+            <a:spAutoFit/>
+          </a:bodyPr>
+          <a:lstStyle/>
+          <a:p>
+            <a:r>
+              <a:rPr lang="en-GB" sz="1400" b="1" dirty="0">
+                <a:latin typeface="Helvetica Neue"/>
+              </a:rPr>
+              <a:t>Week 6</a:t>
+            </a:r>
+          </a:p>
+        </p:txBody>
+      </p:sp>
+      <p:cxnSp>
+        <p:nvCxnSpPr>
+          <p:cNvPr id="38" name="Straight Connector 37">
+            <a:extLst>
+              <a:ext uri="{FF2B5EF4-FFF2-40B4-BE49-F238E27FC236}">
+                <a16:creationId xmlns:a16="http://schemas.microsoft.com/office/drawing/2014/main" id="{A2962899-45E1-78A4-1567-6CCA9BB6FEC9}"/>
+              </a:ext>
+            </a:extLst>
+          </p:cNvPr>
+          <p:cNvCxnSpPr/>
+          <p:nvPr/>
+        </p:nvCxnSpPr>
+        <p:spPr>
+          <a:xfrm>
+            <a:off x="4693209" y="3200208"/>
+            <a:ext cx="0" cy="266700"/>
+          </a:xfrm>
+          <a:prstGeom prst="line">
+            <a:avLst/>
+          </a:prstGeom>
+          <a:ln w="76200">
+            <a:solidFill>
+              <a:schemeClr val="tx1">
+                <a:lumMod val="75000"/>
+                <a:lumOff val="25000"/>
+              </a:schemeClr>
+            </a:solidFill>
+          </a:ln>
+        </p:spPr>
+        <p:style>
+          <a:lnRef idx="1">
+            <a:schemeClr val="accent1"/>
+          </a:lnRef>
+          <a:fillRef idx="0">
+            <a:schemeClr val="accent1"/>
+          </a:fillRef>
+          <a:effectRef idx="0">
+            <a:schemeClr val="accent1"/>
+          </a:effectRef>
+          <a:fontRef idx="minor">
+            <a:schemeClr val="tx1"/>
+          </a:fontRef>
+        </p:style>
+      </p:cxnSp>
+      <p:sp>
+        <p:nvSpPr>
+          <p:cNvPr id="41" name="TextBox 40">
+            <a:extLst>
+              <a:ext uri="{FF2B5EF4-FFF2-40B4-BE49-F238E27FC236}">
+                <a16:creationId xmlns:a16="http://schemas.microsoft.com/office/drawing/2014/main" id="{1F302101-4AB3-2E1E-F252-873A9890F10E}"/>
+              </a:ext>
+            </a:extLst>
+          </p:cNvPr>
+          <p:cNvSpPr txBox="1"/>
+          <p:nvPr/>
+        </p:nvSpPr>
+        <p:spPr>
+          <a:xfrm>
+            <a:off x="2911978" y="4925728"/>
+            <a:ext cx="7222622" cy="561856"/>
+          </a:xfrm>
+          <a:prstGeom prst="roundRect">
+            <a:avLst>
+              <a:gd name="adj" fmla="val 29099"/>
+            </a:avLst>
+          </a:prstGeom>
+          <a:solidFill>
+            <a:srgbClr val="008000"/>
+          </a:solidFill>
+        </p:spPr>
+        <p:txBody>
+          <a:bodyPr wrap="square" rtlCol="0">
+            <a:spAutoFit/>
+          </a:bodyPr>
+          <a:lstStyle/>
+          <a:p>
+            <a:pPr algn="ctr"/>
+            <a:r>
+              <a:rPr lang="en-GB" sz="1350" b="1" dirty="0">
+                <a:solidFill>
+                  <a:schemeClr val="bg1"/>
+                </a:solidFill>
+                <a:latin typeface="Helvetica Neue"/>
+              </a:rPr>
+              <a:t>Patient-Reported Outcome</a:t>
+            </a:r>
+            <a:endParaRPr lang="en-GB" sz="1350" b="1" dirty="0">
+              <a:solidFill>
+                <a:schemeClr val="bg1"/>
+              </a:solidFill>
+              <a:latin typeface="Helvetica Neue"/>
+              <a:sym typeface="Symbol" panose="05050102010706020507" pitchFamily="18" charset="2"/>
+            </a:endParaRPr>
+          </a:p>
+          <a:p>
+            <a:pPr algn="ctr"/>
+            <a:r>
+              <a:rPr lang="en-GB" sz="1350" dirty="0">
+                <a:solidFill>
+                  <a:schemeClr val="bg1"/>
+                </a:solidFill>
+                <a:latin typeface="Helvetica Neue"/>
+              </a:rPr>
+              <a:t>TUMMY-UC Score</a:t>
+            </a:r>
+          </a:p>
+        </p:txBody>
+      </p:sp>
+      <p:cxnSp>
+        <p:nvCxnSpPr>
+          <p:cNvPr id="43" name="Straight Connector 42">
+            <a:extLst>
+              <a:ext uri="{FF2B5EF4-FFF2-40B4-BE49-F238E27FC236}">
+                <a16:creationId xmlns:a16="http://schemas.microsoft.com/office/drawing/2014/main" id="{32378D31-4E60-A941-7E81-FB6A9F8DEE4B}"/>
+              </a:ext>
+            </a:extLst>
+          </p:cNvPr>
+          <p:cNvCxnSpPr/>
+          <p:nvPr/>
+        </p:nvCxnSpPr>
+        <p:spPr>
+          <a:xfrm>
+            <a:off x="7272450" y="3192534"/>
+            <a:ext cx="0" cy="266700"/>
+          </a:xfrm>
+          <a:prstGeom prst="line">
+            <a:avLst/>
+          </a:prstGeom>
+          <a:ln w="76200">
+            <a:solidFill>
+              <a:schemeClr val="tx1">
+                <a:lumMod val="75000"/>
+                <a:lumOff val="25000"/>
+              </a:schemeClr>
+            </a:solidFill>
+          </a:ln>
+        </p:spPr>
+        <p:style>
+          <a:lnRef idx="1">
+            <a:schemeClr val="accent1"/>
+          </a:lnRef>
+          <a:fillRef idx="0">
+            <a:schemeClr val="accent1"/>
+          </a:fillRef>
+          <a:effectRef idx="0">
+            <a:schemeClr val="accent1"/>
+          </a:effectRef>
+          <a:fontRef idx="minor">
+            <a:schemeClr val="tx1"/>
+          </a:fontRef>
+        </p:style>
+      </p:cxnSp>
+      <p:sp>
+        <p:nvSpPr>
+          <p:cNvPr id="44" name="TextBox 43">
+            <a:extLst>
+              <a:ext uri="{FF2B5EF4-FFF2-40B4-BE49-F238E27FC236}">
+                <a16:creationId xmlns:a16="http://schemas.microsoft.com/office/drawing/2014/main" id="{83939289-2A51-716E-ED66-691C8C5F76AF}"/>
+              </a:ext>
+            </a:extLst>
+          </p:cNvPr>
+          <p:cNvSpPr txBox="1"/>
+          <p:nvPr/>
+        </p:nvSpPr>
+        <p:spPr>
+          <a:xfrm>
+            <a:off x="6823481" y="3467652"/>
+            <a:ext cx="897938" cy="307777"/>
+          </a:xfrm>
+          <a:prstGeom prst="rect">
+            <a:avLst/>
+          </a:prstGeom>
+          <a:noFill/>
+        </p:spPr>
+        <p:txBody>
+          <a:bodyPr wrap="none" rtlCol="0">
+            <a:spAutoFit/>
+          </a:bodyPr>
+          <a:lstStyle/>
+          <a:p>
+            <a:r>
+              <a:rPr lang="en-GB" sz="1400" b="1" dirty="0">
+                <a:latin typeface="Helvetica Neue"/>
+              </a:rPr>
+              <a:t>Week 16</a:t>
+            </a:r>
+          </a:p>
+        </p:txBody>
+      </p:sp>
+      <p:cxnSp>
+        <p:nvCxnSpPr>
+          <p:cNvPr id="45" name="Straight Connector 44">
+            <a:extLst>
+              <a:ext uri="{FF2B5EF4-FFF2-40B4-BE49-F238E27FC236}">
+                <a16:creationId xmlns:a16="http://schemas.microsoft.com/office/drawing/2014/main" id="{7832D3D4-8285-4F00-C0FB-F267B2609877}"/>
+              </a:ext>
+            </a:extLst>
+          </p:cNvPr>
+          <p:cNvCxnSpPr/>
+          <p:nvPr/>
+        </p:nvCxnSpPr>
+        <p:spPr>
+          <a:xfrm>
+            <a:off x="8226761" y="3187932"/>
+            <a:ext cx="0" cy="266700"/>
+          </a:xfrm>
+          <a:prstGeom prst="line">
+            <a:avLst/>
+          </a:prstGeom>
+          <a:ln w="76200">
+            <a:solidFill>
+              <a:schemeClr val="tx1">
+                <a:lumMod val="75000"/>
+                <a:lumOff val="25000"/>
+              </a:schemeClr>
+            </a:solidFill>
+          </a:ln>
+        </p:spPr>
+        <p:style>
+          <a:lnRef idx="1">
+            <a:schemeClr val="accent1"/>
+          </a:lnRef>
+          <a:fillRef idx="0">
+            <a:schemeClr val="accent1"/>
+          </a:fillRef>
+          <a:effectRef idx="0">
+            <a:schemeClr val="accent1"/>
+          </a:effectRef>
+          <a:fontRef idx="minor">
+            <a:schemeClr val="tx1"/>
+          </a:fontRef>
+        </p:style>
+      </p:cxnSp>
+      <p:sp>
+        <p:nvSpPr>
+          <p:cNvPr id="46" name="TextBox 45">
+            <a:extLst>
+              <a:ext uri="{FF2B5EF4-FFF2-40B4-BE49-F238E27FC236}">
+                <a16:creationId xmlns:a16="http://schemas.microsoft.com/office/drawing/2014/main" id="{53F45822-5FE4-49F9-9DB9-65266FE07084}"/>
+              </a:ext>
+            </a:extLst>
+          </p:cNvPr>
+          <p:cNvSpPr txBox="1"/>
+          <p:nvPr/>
+        </p:nvSpPr>
+        <p:spPr>
+          <a:xfrm>
+            <a:off x="7777792" y="3463050"/>
+            <a:ext cx="897938" cy="307777"/>
+          </a:xfrm>
+          <a:prstGeom prst="rect">
+            <a:avLst/>
+          </a:prstGeom>
+          <a:noFill/>
+        </p:spPr>
+        <p:txBody>
+          <a:bodyPr wrap="none" rtlCol="0">
+            <a:spAutoFit/>
+          </a:bodyPr>
+          <a:lstStyle/>
+          <a:p>
+            <a:r>
+              <a:rPr lang="en-GB" sz="1400" b="1" dirty="0">
+                <a:latin typeface="Helvetica Neue"/>
+              </a:rPr>
+              <a:t>Week 20</a:t>
+            </a:r>
+          </a:p>
+        </p:txBody>
+      </p:sp>
+    </p:spTree>
+    <p:extLst>
+      <p:ext uri="{BB962C8B-B14F-4D97-AF65-F5344CB8AC3E}">
+        <p14:creationId xmlns:p14="http://schemas.microsoft.com/office/powerpoint/2010/main" val="296533025"/>
+      </p:ext>
+    </p:extLst>
+  </p:cSld>
+  <p:clrMapOvr>
+    <a:masterClrMapping/>
+  </p:clrMapOvr>
+</p:sld>
+</file>
+
+<file path=ppt/slides/slide7.xml><?xml version="1.0" encoding="utf-8"?>
+<p:sld xmlns:a="http://schemas.openxmlformats.org/drawingml/2006/main" xmlns:r="http://schemas.openxmlformats.org/officeDocument/2006/relationships" xmlns:p="http://schemas.openxmlformats.org/presentationml/2006/main">
+  <p:cSld>
+    <p:spTree>
+      <p:nvGrpSpPr>
+        <p:cNvPr id="1" name=""/>
+        <p:cNvGrpSpPr/>
+        <p:nvPr/>
+      </p:nvGrpSpPr>
+      <p:grpSpPr>
+        <a:xfrm>
+          <a:off x="0" y="0"/>
+          <a:ext cx="0" cy="0"/>
+          <a:chOff x="0" y="0"/>
+          <a:chExt cx="0" cy="0"/>
+        </a:xfrm>
+      </p:grpSpPr>
       <p:sp>
         <p:nvSpPr>
           <p:cNvPr id="4" name="Rectangle 3"/>
@@ -5303,7 +6475,7 @@
 </p:sld>
 </file>
 
-<file path=ppt/slides/slide7.xml><?xml version="1.0" encoding="utf-8"?>
+<file path=ppt/slides/slide8.xml><?xml version="1.0" encoding="utf-8"?>
 <p:sld xmlns:a="http://schemas.openxmlformats.org/drawingml/2006/main" xmlns:r="http://schemas.openxmlformats.org/officeDocument/2006/relationships" xmlns:p="http://schemas.openxmlformats.org/presentationml/2006/main">
   <p:cSld>
     <p:spTree>

</xml_diff>

<commit_message>
Update for new trial protocol and pis.
</commit_message>
<xml_diff>
--- a/design/Marvel Icon.pptx
+++ b/design/Marvel Icon.pptx
@@ -215,7 +215,7 @@
           <a:p>
             <a:fld id="{53A2C0CD-0C98-644B-B761-F97DDC04F59E}" type="datetimeFigureOut">
               <a:rPr lang="en-US" smtClean="0"/>
-              <a:t>10/24/2022</a:t>
+              <a:t>8/12/25</a:t>
             </a:fld>
             <a:endParaRPr lang="en-US"/>
           </a:p>
@@ -664,7 +664,7 @@
           <a:p>
             <a:fld id="{B4E1D56B-60CF-8C4B-97C0-D25BCDB18721}" type="datetimeFigureOut">
               <a:rPr lang="en-US" smtClean="0"/>
-              <a:t>10/24/2022</a:t>
+              <a:t>8/12/25</a:t>
             </a:fld>
             <a:endParaRPr lang="en-US"/>
           </a:p>
@@ -834,7 +834,7 @@
           <a:p>
             <a:fld id="{B4E1D56B-60CF-8C4B-97C0-D25BCDB18721}" type="datetimeFigureOut">
               <a:rPr lang="en-US" smtClean="0"/>
-              <a:t>10/24/2022</a:t>
+              <a:t>8/12/25</a:t>
             </a:fld>
             <a:endParaRPr lang="en-US"/>
           </a:p>
@@ -1014,7 +1014,7 @@
           <a:p>
             <a:fld id="{B4E1D56B-60CF-8C4B-97C0-D25BCDB18721}" type="datetimeFigureOut">
               <a:rPr lang="en-US" smtClean="0"/>
-              <a:t>10/24/2022</a:t>
+              <a:t>8/12/25</a:t>
             </a:fld>
             <a:endParaRPr lang="en-US"/>
           </a:p>
@@ -1184,7 +1184,7 @@
           <a:p>
             <a:fld id="{B4E1D56B-60CF-8C4B-97C0-D25BCDB18721}" type="datetimeFigureOut">
               <a:rPr lang="en-US" smtClean="0"/>
-              <a:t>10/24/2022</a:t>
+              <a:t>8/12/25</a:t>
             </a:fld>
             <a:endParaRPr lang="en-US"/>
           </a:p>
@@ -1430,7 +1430,7 @@
           <a:p>
             <a:fld id="{B4E1D56B-60CF-8C4B-97C0-D25BCDB18721}" type="datetimeFigureOut">
               <a:rPr lang="en-US" smtClean="0"/>
-              <a:t>10/24/2022</a:t>
+              <a:t>8/12/25</a:t>
             </a:fld>
             <a:endParaRPr lang="en-US"/>
           </a:p>
@@ -1718,7 +1718,7 @@
           <a:p>
             <a:fld id="{B4E1D56B-60CF-8C4B-97C0-D25BCDB18721}" type="datetimeFigureOut">
               <a:rPr lang="en-US" smtClean="0"/>
-              <a:t>10/24/2022</a:t>
+              <a:t>8/12/25</a:t>
             </a:fld>
             <a:endParaRPr lang="en-US"/>
           </a:p>
@@ -2140,7 +2140,7 @@
           <a:p>
             <a:fld id="{B4E1D56B-60CF-8C4B-97C0-D25BCDB18721}" type="datetimeFigureOut">
               <a:rPr lang="en-US" smtClean="0"/>
-              <a:t>10/24/2022</a:t>
+              <a:t>8/12/25</a:t>
             </a:fld>
             <a:endParaRPr lang="en-US"/>
           </a:p>
@@ -2258,7 +2258,7 @@
           <a:p>
             <a:fld id="{B4E1D56B-60CF-8C4B-97C0-D25BCDB18721}" type="datetimeFigureOut">
               <a:rPr lang="en-US" smtClean="0"/>
-              <a:t>10/24/2022</a:t>
+              <a:t>8/12/25</a:t>
             </a:fld>
             <a:endParaRPr lang="en-US"/>
           </a:p>
@@ -2353,7 +2353,7 @@
           <a:p>
             <a:fld id="{B4E1D56B-60CF-8C4B-97C0-D25BCDB18721}" type="datetimeFigureOut">
               <a:rPr lang="en-US" smtClean="0"/>
-              <a:t>10/24/2022</a:t>
+              <a:t>8/12/25</a:t>
             </a:fld>
             <a:endParaRPr lang="en-US"/>
           </a:p>
@@ -2630,7 +2630,7 @@
           <a:p>
             <a:fld id="{B4E1D56B-60CF-8C4B-97C0-D25BCDB18721}" type="datetimeFigureOut">
               <a:rPr lang="en-US" smtClean="0"/>
-              <a:t>10/24/2022</a:t>
+              <a:t>8/12/25</a:t>
             </a:fld>
             <a:endParaRPr lang="en-US"/>
           </a:p>
@@ -2883,7 +2883,7 @@
           <a:p>
             <a:fld id="{B4E1D56B-60CF-8C4B-97C0-D25BCDB18721}" type="datetimeFigureOut">
               <a:rPr lang="en-US" smtClean="0"/>
-              <a:t>10/24/2022</a:t>
+              <a:t>8/12/25</a:t>
             </a:fld>
             <a:endParaRPr lang="en-US"/>
           </a:p>
@@ -3096,7 +3096,7 @@
           <a:p>
             <a:fld id="{B4E1D56B-60CF-8C4B-97C0-D25BCDB18721}" type="datetimeFigureOut">
               <a:rPr lang="en-US" smtClean="0"/>
-              <a:t>10/24/2022</a:t>
+              <a:t>8/12/25</a:t>
             </a:fld>
             <a:endParaRPr lang="en-US"/>
           </a:p>
@@ -4638,7 +4638,7 @@
         </p:nvSpPr>
         <p:spPr>
           <a:xfrm>
-            <a:off x="1482100" y="1911363"/>
+            <a:off x="1605670" y="1911363"/>
             <a:ext cx="1451038" cy="461665"/>
           </a:xfrm>
           <a:prstGeom prst="rect">
@@ -4744,13 +4744,15 @@
       <p:cxnSp>
         <p:nvCxnSpPr>
           <p:cNvPr id="17" name="Straight Connector 16"/>
-          <p:cNvCxnSpPr/>
+          <p:cNvCxnSpPr>
+            <a:cxnSpLocks/>
+          </p:cNvCxnSpPr>
           <p:nvPr/>
         </p:nvCxnSpPr>
         <p:spPr>
-          <a:xfrm flipV="1">
-            <a:off x="1564650" y="3080064"/>
-            <a:ext cx="1443037" cy="2918"/>
+          <a:xfrm>
+            <a:off x="1692876" y="3080064"/>
+            <a:ext cx="1314811" cy="0"/>
           </a:xfrm>
           <a:prstGeom prst="line">
             <a:avLst/>
@@ -4941,8 +4943,8 @@
         </p:nvSpPr>
         <p:spPr>
           <a:xfrm>
-            <a:off x="1482100" y="2496530"/>
-            <a:ext cx="1386918" cy="523220"/>
+            <a:off x="1605670" y="2496530"/>
+            <a:ext cx="1043876" cy="523220"/>
           </a:xfrm>
           <a:prstGeom prst="rect">
             <a:avLst/>
@@ -4973,7 +4975,7 @@
                 </a:solidFill>
                 <a:latin typeface="Helvetica Neue"/>
               </a:rPr>
-              <a:t>(Max 2 weeks)</a:t>
+              <a:t>(4 weeks)</a:t>
             </a:r>
           </a:p>
         </p:txBody>

</xml_diff>